<commit_message>
further work; brought in Clemens's ppt
</commit_message>
<xml_diff>
--- a/Containers and Clusters in Azure.pptx
+++ b/Containers and Clusters in Azure.pptx
@@ -5,10 +5,10 @@
     <p:sldMasterId id="2147483660" r:id="rId2"/>
   </p:sldMasterIdLst>
   <p:notesMasterIdLst>
-    <p:notesMasterId r:id="rId21"/>
+    <p:notesMasterId r:id="rId25"/>
   </p:notesMasterIdLst>
   <p:handoutMasterIdLst>
-    <p:handoutMasterId r:id="rId22"/>
+    <p:handoutMasterId r:id="rId26"/>
   </p:handoutMasterIdLst>
   <p:sldIdLst>
     <p:sldId id="256" r:id="rId3"/>
@@ -25,10 +25,14 @@
     <p:sldId id="262" r:id="rId14"/>
     <p:sldId id="263" r:id="rId15"/>
     <p:sldId id="274" r:id="rId16"/>
-    <p:sldId id="270" r:id="rId17"/>
-    <p:sldId id="264" r:id="rId18"/>
-    <p:sldId id="265" r:id="rId19"/>
-    <p:sldId id="266" r:id="rId20"/>
+    <p:sldId id="276" r:id="rId17"/>
+    <p:sldId id="277" r:id="rId18"/>
+    <p:sldId id="278" r:id="rId19"/>
+    <p:sldId id="279" r:id="rId20"/>
+    <p:sldId id="270" r:id="rId21"/>
+    <p:sldId id="264" r:id="rId22"/>
+    <p:sldId id="265" r:id="rId23"/>
+    <p:sldId id="266" r:id="rId24"/>
   </p:sldIdLst>
   <p:sldSz cx="12192000" cy="6858000"/>
   <p:notesSz cx="6858000" cy="9144000"/>
@@ -136,6 +140,10 @@
     </p:ext>
   </p:extLst>
 </p:presentation>
+</file>
+
+<file path=ppt/activeX/activeX1.xml><?xml version="1.0" encoding="utf-8"?>
+<ax:ocx xmlns:ax="http://schemas.microsoft.com/office/2006/activeX" xmlns:r="http://schemas.openxmlformats.org/officeDocument/2006/relationships" ax:classid="{D27CDB6E-AE6D-11CF-96B8-444553540000}" ax:persistence="persistStorage" r:id="rId1"/>
 </file>
 
 <file path=ppt/diagrams/colors1.xml><?xml version="1.0" encoding="utf-8"?>
@@ -10795,6 +10803,1250 @@
           <a:p>
             <a:r>
               <a:rPr lang="en-US" dirty="0" smtClean="0"/>
+              <a:t>What do </a:t>
+            </a:r>
+            <a:r>
+              <a:rPr lang="en-US" dirty="0" err="1" smtClean="0"/>
+              <a:t>Microservices</a:t>
+            </a:r>
+            <a:r>
+              <a:rPr lang="en-US" dirty="0" smtClean="0"/>
+              <a:t> mean? </a:t>
+            </a:r>
+            <a:endParaRPr lang="en-US" dirty="0"/>
+          </a:p>
+        </p:txBody>
+      </p:sp>
+      <p:sp>
+        <p:nvSpPr>
+          <p:cNvPr id="3" name="TextBox 2"/>
+          <p:cNvSpPr txBox="1"/>
+          <p:nvPr/>
+        </p:nvSpPr>
+        <p:spPr>
+          <a:xfrm>
+            <a:off x="838200" y="2209800"/>
+            <a:ext cx="7239000" cy="369332"/>
+          </a:xfrm>
+          <a:prstGeom prst="rect">
+            <a:avLst/>
+          </a:prstGeom>
+          <a:noFill/>
+        </p:spPr>
+        <p:txBody>
+          <a:bodyPr wrap="square" rtlCol="0">
+            <a:spAutoFit/>
+          </a:bodyPr>
+          <a:lstStyle/>
+          <a:p>
+            <a:r>
+              <a:rPr lang="en-US" dirty="0" smtClean="0"/>
+              <a:t>Tons and tons of apps….</a:t>
+            </a:r>
+            <a:endParaRPr lang="en-US" dirty="0"/>
+          </a:p>
+        </p:txBody>
+      </p:sp>
+      <p:sp>
+        <p:nvSpPr>
+          <p:cNvPr id="5" name="TextBox 4"/>
+          <p:cNvSpPr txBox="1"/>
+          <p:nvPr/>
+        </p:nvSpPr>
+        <p:spPr>
+          <a:xfrm>
+            <a:off x="838200" y="2751018"/>
+            <a:ext cx="7239000" cy="369332"/>
+          </a:xfrm>
+          <a:prstGeom prst="rect">
+            <a:avLst/>
+          </a:prstGeom>
+          <a:noFill/>
+        </p:spPr>
+        <p:txBody>
+          <a:bodyPr wrap="square" rtlCol="0">
+            <a:spAutoFit/>
+          </a:bodyPr>
+          <a:lstStyle/>
+          <a:p>
+            <a:r>
+              <a:rPr lang="en-US" dirty="0" smtClean="0"/>
+              <a:t>Inside tons and tons of containers….</a:t>
+            </a:r>
+            <a:endParaRPr lang="en-US" dirty="0"/>
+          </a:p>
+        </p:txBody>
+      </p:sp>
+      <p:sp>
+        <p:nvSpPr>
+          <p:cNvPr id="6" name="TextBox 5"/>
+          <p:cNvSpPr txBox="1"/>
+          <p:nvPr/>
+        </p:nvSpPr>
+        <p:spPr>
+          <a:xfrm>
+            <a:off x="838200" y="3292236"/>
+            <a:ext cx="7239000" cy="369332"/>
+          </a:xfrm>
+          <a:prstGeom prst="rect">
+            <a:avLst/>
+          </a:prstGeom>
+          <a:noFill/>
+        </p:spPr>
+        <p:txBody>
+          <a:bodyPr wrap="square" rtlCol="0">
+            <a:spAutoFit/>
+          </a:bodyPr>
+          <a:lstStyle/>
+          <a:p>
+            <a:r>
+              <a:rPr lang="en-US" dirty="0" smtClean="0"/>
+              <a:t>Running on tons and tons of VMs….</a:t>
+            </a:r>
+            <a:endParaRPr lang="en-US" dirty="0"/>
+          </a:p>
+        </p:txBody>
+      </p:sp>
+      <p:sp>
+        <p:nvSpPr>
+          <p:cNvPr id="7" name="TextBox 6"/>
+          <p:cNvSpPr txBox="1"/>
+          <p:nvPr/>
+        </p:nvSpPr>
+        <p:spPr>
+          <a:xfrm>
+            <a:off x="838200" y="3833454"/>
+            <a:ext cx="7239000" cy="369332"/>
+          </a:xfrm>
+          <a:prstGeom prst="rect">
+            <a:avLst/>
+          </a:prstGeom>
+          <a:noFill/>
+        </p:spPr>
+        <p:txBody>
+          <a:bodyPr wrap="square" rtlCol="0">
+            <a:spAutoFit/>
+          </a:bodyPr>
+          <a:lstStyle/>
+          <a:p>
+            <a:r>
+              <a:rPr lang="en-US" dirty="0" smtClean="0"/>
+              <a:t>Running on tons of operating systems….</a:t>
+            </a:r>
+            <a:endParaRPr lang="en-US" dirty="0"/>
+          </a:p>
+        </p:txBody>
+      </p:sp>
+      <p:sp>
+        <p:nvSpPr>
+          <p:cNvPr id="8" name="TextBox 7"/>
+          <p:cNvSpPr txBox="1"/>
+          <p:nvPr/>
+        </p:nvSpPr>
+        <p:spPr>
+          <a:xfrm>
+            <a:off x="838200" y="4374672"/>
+            <a:ext cx="7239000" cy="369332"/>
+          </a:xfrm>
+          <a:prstGeom prst="rect">
+            <a:avLst/>
+          </a:prstGeom>
+          <a:noFill/>
+        </p:spPr>
+        <p:txBody>
+          <a:bodyPr wrap="square" rtlCol="0">
+            <a:spAutoFit/>
+          </a:bodyPr>
+          <a:lstStyle/>
+          <a:p>
+            <a:r>
+              <a:rPr lang="en-US" dirty="0" smtClean="0"/>
+              <a:t>Running on a bunch of physical computers….</a:t>
+            </a:r>
+            <a:endParaRPr lang="en-US" dirty="0"/>
+          </a:p>
+        </p:txBody>
+      </p:sp>
+      <p:sp>
+        <p:nvSpPr>
+          <p:cNvPr id="9" name="TextBox 8"/>
+          <p:cNvSpPr txBox="1"/>
+          <p:nvPr/>
+        </p:nvSpPr>
+        <p:spPr>
+          <a:xfrm>
+            <a:off x="6172200" y="5638800"/>
+            <a:ext cx="5638800" cy="369332"/>
+          </a:xfrm>
+          <a:prstGeom prst="rect">
+            <a:avLst/>
+          </a:prstGeom>
+          <a:noFill/>
+        </p:spPr>
+        <p:txBody>
+          <a:bodyPr wrap="square" rtlCol="0">
+            <a:spAutoFit/>
+          </a:bodyPr>
+          <a:lstStyle/>
+          <a:p>
+            <a:r>
+              <a:rPr lang="en-US" dirty="0" smtClean="0"/>
+              <a:t>You’re going to need a bigger boat.</a:t>
+            </a:r>
+            <a:endParaRPr lang="en-US" dirty="0"/>
+          </a:p>
+        </p:txBody>
+      </p:sp>
+    </p:spTree>
+    <p:extLst>
+      <p:ext uri="{BB962C8B-B14F-4D97-AF65-F5344CB8AC3E}">
+        <p14:creationId xmlns:p14="http://schemas.microsoft.com/office/powerpoint/2010/main" val="1591328291"/>
+      </p:ext>
+    </p:extLst>
+  </p:cSld>
+  <p:clrMapOvr>
+    <a:masterClrMapping/>
+  </p:clrMapOvr>
+  <mc:AlternateContent xmlns:mc="http://schemas.openxmlformats.org/markup-compatibility/2006">
+    <mc:Choice xmlns:p14="http://schemas.microsoft.com/office/powerpoint/2010/main" Requires="p14">
+      <p:transition spd="med" p14:dur="700">
+        <p:fade/>
+      </p:transition>
+    </mc:Choice>
+    <mc:Fallback>
+      <p:transition spd="med">
+        <p:fade/>
+      </p:transition>
+    </mc:Fallback>
+  </mc:AlternateContent>
+  <p:timing>
+    <p:tnLst>
+      <p:par>
+        <p:cTn id="1" dur="indefinite" restart="never" nodeType="tmRoot">
+          <p:childTnLst>
+            <p:seq concurrent="1" nextAc="seek">
+              <p:cTn id="2" dur="indefinite" nodeType="mainSeq">
+                <p:childTnLst>
+                  <p:par>
+                    <p:cTn id="3" fill="hold">
+                      <p:stCondLst>
+                        <p:cond delay="indefinite"/>
+                      </p:stCondLst>
+                      <p:childTnLst>
+                        <p:par>
+                          <p:cTn id="4" fill="hold">
+                            <p:stCondLst>
+                              <p:cond delay="0"/>
+                            </p:stCondLst>
+                            <p:childTnLst>
+                              <p:par>
+                                <p:cTn id="5" presetID="10" presetClass="entr" presetSubtype="0" fill="hold" grpId="0" nodeType="clickEffect">
+                                  <p:stCondLst>
+                                    <p:cond delay="0"/>
+                                  </p:stCondLst>
+                                  <p:childTnLst>
+                                    <p:set>
+                                      <p:cBhvr>
+                                        <p:cTn id="6" dur="1" fill="hold">
+                                          <p:stCondLst>
+                                            <p:cond delay="0"/>
+                                          </p:stCondLst>
+                                        </p:cTn>
+                                        <p:tgtEl>
+                                          <p:spTgt spid="3"/>
+                                        </p:tgtEl>
+                                        <p:attrNameLst>
+                                          <p:attrName>style.visibility</p:attrName>
+                                        </p:attrNameLst>
+                                      </p:cBhvr>
+                                      <p:to>
+                                        <p:strVal val="visible"/>
+                                      </p:to>
+                                    </p:set>
+                                    <p:animEffect transition="in" filter="fade">
+                                      <p:cBhvr>
+                                        <p:cTn id="7" dur="500"/>
+                                        <p:tgtEl>
+                                          <p:spTgt spid="3"/>
+                                        </p:tgtEl>
+                                      </p:cBhvr>
+                                    </p:animEffect>
+                                  </p:childTnLst>
+                                </p:cTn>
+                              </p:par>
+                            </p:childTnLst>
+                          </p:cTn>
+                        </p:par>
+                      </p:childTnLst>
+                    </p:cTn>
+                  </p:par>
+                  <p:par>
+                    <p:cTn id="8" fill="hold">
+                      <p:stCondLst>
+                        <p:cond delay="indefinite"/>
+                      </p:stCondLst>
+                      <p:childTnLst>
+                        <p:par>
+                          <p:cTn id="9" fill="hold">
+                            <p:stCondLst>
+                              <p:cond delay="0"/>
+                            </p:stCondLst>
+                            <p:childTnLst>
+                              <p:par>
+                                <p:cTn id="10" presetID="10" presetClass="entr" presetSubtype="0" fill="hold" grpId="0" nodeType="clickEffect">
+                                  <p:stCondLst>
+                                    <p:cond delay="0"/>
+                                  </p:stCondLst>
+                                  <p:childTnLst>
+                                    <p:set>
+                                      <p:cBhvr>
+                                        <p:cTn id="11" dur="1" fill="hold">
+                                          <p:stCondLst>
+                                            <p:cond delay="0"/>
+                                          </p:stCondLst>
+                                        </p:cTn>
+                                        <p:tgtEl>
+                                          <p:spTgt spid="5"/>
+                                        </p:tgtEl>
+                                        <p:attrNameLst>
+                                          <p:attrName>style.visibility</p:attrName>
+                                        </p:attrNameLst>
+                                      </p:cBhvr>
+                                      <p:to>
+                                        <p:strVal val="visible"/>
+                                      </p:to>
+                                    </p:set>
+                                    <p:animEffect transition="in" filter="fade">
+                                      <p:cBhvr>
+                                        <p:cTn id="12" dur="500"/>
+                                        <p:tgtEl>
+                                          <p:spTgt spid="5"/>
+                                        </p:tgtEl>
+                                      </p:cBhvr>
+                                    </p:animEffect>
+                                  </p:childTnLst>
+                                </p:cTn>
+                              </p:par>
+                            </p:childTnLst>
+                          </p:cTn>
+                        </p:par>
+                      </p:childTnLst>
+                    </p:cTn>
+                  </p:par>
+                  <p:par>
+                    <p:cTn id="13" fill="hold">
+                      <p:stCondLst>
+                        <p:cond delay="indefinite"/>
+                      </p:stCondLst>
+                      <p:childTnLst>
+                        <p:par>
+                          <p:cTn id="14" fill="hold">
+                            <p:stCondLst>
+                              <p:cond delay="0"/>
+                            </p:stCondLst>
+                            <p:childTnLst>
+                              <p:par>
+                                <p:cTn id="15" presetID="10" presetClass="entr" presetSubtype="0" fill="hold" grpId="0" nodeType="clickEffect">
+                                  <p:stCondLst>
+                                    <p:cond delay="0"/>
+                                  </p:stCondLst>
+                                  <p:childTnLst>
+                                    <p:set>
+                                      <p:cBhvr>
+                                        <p:cTn id="16" dur="1" fill="hold">
+                                          <p:stCondLst>
+                                            <p:cond delay="0"/>
+                                          </p:stCondLst>
+                                        </p:cTn>
+                                        <p:tgtEl>
+                                          <p:spTgt spid="6"/>
+                                        </p:tgtEl>
+                                        <p:attrNameLst>
+                                          <p:attrName>style.visibility</p:attrName>
+                                        </p:attrNameLst>
+                                      </p:cBhvr>
+                                      <p:to>
+                                        <p:strVal val="visible"/>
+                                      </p:to>
+                                    </p:set>
+                                    <p:animEffect transition="in" filter="fade">
+                                      <p:cBhvr>
+                                        <p:cTn id="17" dur="500"/>
+                                        <p:tgtEl>
+                                          <p:spTgt spid="6"/>
+                                        </p:tgtEl>
+                                      </p:cBhvr>
+                                    </p:animEffect>
+                                  </p:childTnLst>
+                                </p:cTn>
+                              </p:par>
+                            </p:childTnLst>
+                          </p:cTn>
+                        </p:par>
+                      </p:childTnLst>
+                    </p:cTn>
+                  </p:par>
+                  <p:par>
+                    <p:cTn id="18" fill="hold">
+                      <p:stCondLst>
+                        <p:cond delay="indefinite"/>
+                      </p:stCondLst>
+                      <p:childTnLst>
+                        <p:par>
+                          <p:cTn id="19" fill="hold">
+                            <p:stCondLst>
+                              <p:cond delay="0"/>
+                            </p:stCondLst>
+                            <p:childTnLst>
+                              <p:par>
+                                <p:cTn id="20" presetID="10" presetClass="entr" presetSubtype="0" fill="hold" grpId="0" nodeType="clickEffect">
+                                  <p:stCondLst>
+                                    <p:cond delay="0"/>
+                                  </p:stCondLst>
+                                  <p:childTnLst>
+                                    <p:set>
+                                      <p:cBhvr>
+                                        <p:cTn id="21" dur="1" fill="hold">
+                                          <p:stCondLst>
+                                            <p:cond delay="0"/>
+                                          </p:stCondLst>
+                                        </p:cTn>
+                                        <p:tgtEl>
+                                          <p:spTgt spid="7"/>
+                                        </p:tgtEl>
+                                        <p:attrNameLst>
+                                          <p:attrName>style.visibility</p:attrName>
+                                        </p:attrNameLst>
+                                      </p:cBhvr>
+                                      <p:to>
+                                        <p:strVal val="visible"/>
+                                      </p:to>
+                                    </p:set>
+                                    <p:animEffect transition="in" filter="fade">
+                                      <p:cBhvr>
+                                        <p:cTn id="22" dur="500"/>
+                                        <p:tgtEl>
+                                          <p:spTgt spid="7"/>
+                                        </p:tgtEl>
+                                      </p:cBhvr>
+                                    </p:animEffect>
+                                  </p:childTnLst>
+                                </p:cTn>
+                              </p:par>
+                            </p:childTnLst>
+                          </p:cTn>
+                        </p:par>
+                      </p:childTnLst>
+                    </p:cTn>
+                  </p:par>
+                  <p:par>
+                    <p:cTn id="23" fill="hold">
+                      <p:stCondLst>
+                        <p:cond delay="indefinite"/>
+                      </p:stCondLst>
+                      <p:childTnLst>
+                        <p:par>
+                          <p:cTn id="24" fill="hold">
+                            <p:stCondLst>
+                              <p:cond delay="0"/>
+                            </p:stCondLst>
+                            <p:childTnLst>
+                              <p:par>
+                                <p:cTn id="25" presetID="10" presetClass="entr" presetSubtype="0" fill="hold" grpId="0" nodeType="clickEffect">
+                                  <p:stCondLst>
+                                    <p:cond delay="0"/>
+                                  </p:stCondLst>
+                                  <p:childTnLst>
+                                    <p:set>
+                                      <p:cBhvr>
+                                        <p:cTn id="26" dur="1" fill="hold">
+                                          <p:stCondLst>
+                                            <p:cond delay="0"/>
+                                          </p:stCondLst>
+                                        </p:cTn>
+                                        <p:tgtEl>
+                                          <p:spTgt spid="8"/>
+                                        </p:tgtEl>
+                                        <p:attrNameLst>
+                                          <p:attrName>style.visibility</p:attrName>
+                                        </p:attrNameLst>
+                                      </p:cBhvr>
+                                      <p:to>
+                                        <p:strVal val="visible"/>
+                                      </p:to>
+                                    </p:set>
+                                    <p:animEffect transition="in" filter="fade">
+                                      <p:cBhvr>
+                                        <p:cTn id="27" dur="500"/>
+                                        <p:tgtEl>
+                                          <p:spTgt spid="8"/>
+                                        </p:tgtEl>
+                                      </p:cBhvr>
+                                    </p:animEffect>
+                                  </p:childTnLst>
+                                </p:cTn>
+                              </p:par>
+                            </p:childTnLst>
+                          </p:cTn>
+                        </p:par>
+                      </p:childTnLst>
+                    </p:cTn>
+                  </p:par>
+                </p:childTnLst>
+              </p:cTn>
+              <p:prevCondLst>
+                <p:cond evt="onPrev" delay="0">
+                  <p:tgtEl>
+                    <p:sldTgt/>
+                  </p:tgtEl>
+                </p:cond>
+              </p:prevCondLst>
+              <p:nextCondLst>
+                <p:cond evt="onNext" delay="0">
+                  <p:tgtEl>
+                    <p:sldTgt/>
+                  </p:tgtEl>
+                </p:cond>
+              </p:nextCondLst>
+            </p:seq>
+          </p:childTnLst>
+        </p:cTn>
+      </p:par>
+    </p:tnLst>
+    <p:bldLst>
+      <p:bldP spid="3" grpId="0"/>
+      <p:bldP spid="5" grpId="0"/>
+      <p:bldP spid="6" grpId="0"/>
+      <p:bldP spid="7" grpId="0"/>
+      <p:bldP spid="8" grpId="0"/>
+    </p:bldLst>
+  </p:timing>
+</p:sld>
+</file>
+
+<file path=ppt/slides/slide16.xml><?xml version="1.0" encoding="utf-8"?>
+<p:sld xmlns:a="http://schemas.openxmlformats.org/drawingml/2006/main" xmlns:r="http://schemas.openxmlformats.org/officeDocument/2006/relationships" xmlns:p="http://schemas.openxmlformats.org/presentationml/2006/main">
+  <p:cSld>
+    <p:spTree>
+      <p:nvGrpSpPr>
+        <p:cNvPr id="1" name=""/>
+        <p:cNvGrpSpPr/>
+        <p:nvPr/>
+      </p:nvGrpSpPr>
+      <p:grpSpPr>
+        <a:xfrm>
+          <a:off x="0" y="0"/>
+          <a:ext cx="0" cy="0"/>
+          <a:chOff x="0" y="0"/>
+          <a:chExt cx="0" cy="0"/>
+        </a:xfrm>
+      </p:grpSpPr>
+      <p:sp>
+        <p:nvSpPr>
+          <p:cNvPr id="2" name="Title 1"/>
+          <p:cNvSpPr>
+            <a:spLocks noGrp="1"/>
+          </p:cNvSpPr>
+          <p:nvPr>
+            <p:ph type="title"/>
+          </p:nvPr>
+        </p:nvSpPr>
+        <p:spPr/>
+        <p:txBody>
+          <a:bodyPr/>
+          <a:lstStyle/>
+          <a:p>
+            <a:r>
+              <a:rPr lang="en-US" dirty="0" smtClean="0"/>
+              <a:t>Make you feel a bit like this?</a:t>
+            </a:r>
+            <a:endParaRPr lang="en-US" dirty="0"/>
+          </a:p>
+        </p:txBody>
+      </p:sp>
+    </p:spTree>
+    <p:controls>
+      <mc:AlternateContent xmlns:mc="http://schemas.openxmlformats.org/markup-compatibility/2006">
+        <mc:Choice xmlns:v="urn:schemas-microsoft-com:vml" Requires="v">
+          <p:control spid="1028" name="ShockwaveFlash1" r:id="rId2" imgW="8229600" imgH="4572000"/>
+        </mc:Choice>
+        <mc:Fallback>
+          <p:control name="ShockwaveFlash1" r:id="rId2" imgW="8229600" imgH="4572000">
+            <p:pic>
+              <p:nvPicPr>
+                <p:cNvPr id="3" name="ShockwaveFlash1"/>
+                <p:cNvPicPr>
+                  <a:picLocks/>
+                </p:cNvPicPr>
+                <p:nvPr/>
+              </p:nvPicPr>
+              <p:blipFill>
+                <a:blip r:embed="rId4"/>
+                <a:stretch>
+                  <a:fillRect/>
+                </a:stretch>
+              </p:blipFill>
+              <p:spPr>
+                <a:xfrm>
+                  <a:off x="1600200" y="1447800"/>
+                  <a:ext cx="8229600" cy="4572000"/>
+                </a:xfrm>
+                <a:prstGeom prst="rect">
+                  <a:avLst/>
+                </a:prstGeom>
+              </p:spPr>
+            </p:pic>
+          </p:control>
+        </mc:Fallback>
+      </mc:AlternateContent>
+    </p:controls>
+    <p:extLst>
+      <p:ext uri="{BB962C8B-B14F-4D97-AF65-F5344CB8AC3E}">
+        <p14:creationId xmlns:p14="http://schemas.microsoft.com/office/powerpoint/2010/main" val="2261242925"/>
+      </p:ext>
+    </p:extLst>
+  </p:cSld>
+  <p:clrMapOvr>
+    <a:masterClrMapping/>
+  </p:clrMapOvr>
+  <mc:AlternateContent xmlns:mc="http://schemas.openxmlformats.org/markup-compatibility/2006">
+    <mc:Choice xmlns:p14="http://schemas.microsoft.com/office/powerpoint/2010/main" Requires="p14">
+      <p:transition spd="med" p14:dur="700">
+        <p:fade/>
+      </p:transition>
+    </mc:Choice>
+    <mc:Fallback>
+      <p:transition spd="med">
+        <p:fade/>
+      </p:transition>
+    </mc:Fallback>
+  </mc:AlternateContent>
+  <p:timing>
+    <p:tnLst>
+      <p:par>
+        <p:cTn id="1" dur="indefinite" restart="never" nodeType="tmRoot"/>
+      </p:par>
+    </p:tnLst>
+  </p:timing>
+</p:sld>
+</file>
+
+<file path=ppt/slides/slide17.xml><?xml version="1.0" encoding="utf-8"?>
+<p:sld xmlns:a="http://schemas.openxmlformats.org/drawingml/2006/main" xmlns:r="http://schemas.openxmlformats.org/officeDocument/2006/relationships" xmlns:p="http://schemas.openxmlformats.org/presentationml/2006/main">
+  <p:cSld>
+    <p:spTree>
+      <p:nvGrpSpPr>
+        <p:cNvPr id="1" name=""/>
+        <p:cNvGrpSpPr/>
+        <p:nvPr/>
+      </p:nvGrpSpPr>
+      <p:grpSpPr>
+        <a:xfrm>
+          <a:off x="0" y="0"/>
+          <a:ext cx="0" cy="0"/>
+          <a:chOff x="0" y="0"/>
+          <a:chExt cx="0" cy="0"/>
+        </a:xfrm>
+      </p:grpSpPr>
+      <p:sp>
+        <p:nvSpPr>
+          <p:cNvPr id="2" name="Title 1"/>
+          <p:cNvSpPr>
+            <a:spLocks noGrp="1"/>
+          </p:cNvSpPr>
+          <p:nvPr>
+            <p:ph type="title"/>
+          </p:nvPr>
+        </p:nvSpPr>
+        <p:spPr>
+          <a:xfrm>
+            <a:off x="646111" y="452718"/>
+            <a:ext cx="9869489" cy="1400530"/>
+          </a:xfrm>
+        </p:spPr>
+        <p:txBody>
+          <a:bodyPr/>
+          <a:lstStyle/>
+          <a:p>
+            <a:r>
+              <a:rPr lang="en-US" dirty="0" smtClean="0"/>
+              <a:t>You’re going to need orchestration.</a:t>
+            </a:r>
+            <a:endParaRPr lang="en-US" dirty="0"/>
+          </a:p>
+        </p:txBody>
+      </p:sp>
+      <p:sp>
+        <p:nvSpPr>
+          <p:cNvPr id="3" name="TextBox 2"/>
+          <p:cNvSpPr txBox="1"/>
+          <p:nvPr/>
+        </p:nvSpPr>
+        <p:spPr>
+          <a:xfrm>
+            <a:off x="838200" y="1600200"/>
+            <a:ext cx="5715000" cy="369332"/>
+          </a:xfrm>
+          <a:prstGeom prst="rect">
+            <a:avLst/>
+          </a:prstGeom>
+          <a:noFill/>
+        </p:spPr>
+        <p:txBody>
+          <a:bodyPr wrap="square" rtlCol="0">
+            <a:spAutoFit/>
+          </a:bodyPr>
+          <a:lstStyle/>
+          <a:p>
+            <a:r>
+              <a:rPr lang="en-US" dirty="0" smtClean="0"/>
+              <a:t>No, not BizTalk.</a:t>
+            </a:r>
+            <a:endParaRPr lang="en-US" dirty="0"/>
+          </a:p>
+        </p:txBody>
+      </p:sp>
+    </p:spTree>
+    <p:extLst>
+      <p:ext uri="{BB962C8B-B14F-4D97-AF65-F5344CB8AC3E}">
+        <p14:creationId xmlns:p14="http://schemas.microsoft.com/office/powerpoint/2010/main" val="4259514802"/>
+      </p:ext>
+    </p:extLst>
+  </p:cSld>
+  <p:clrMapOvr>
+    <a:masterClrMapping/>
+  </p:clrMapOvr>
+  <mc:AlternateContent xmlns:mc="http://schemas.openxmlformats.org/markup-compatibility/2006">
+    <mc:Choice xmlns:p14="http://schemas.microsoft.com/office/powerpoint/2010/main" Requires="p14">
+      <p:transition spd="med" p14:dur="700">
+        <p:fade/>
+      </p:transition>
+    </mc:Choice>
+    <mc:Fallback>
+      <p:transition spd="med">
+        <p:fade/>
+      </p:transition>
+    </mc:Fallback>
+  </mc:AlternateContent>
+  <p:timing>
+    <p:tnLst>
+      <p:par>
+        <p:cTn id="1" dur="indefinite" restart="never" nodeType="tmRoot">
+          <p:childTnLst>
+            <p:seq concurrent="1" nextAc="seek">
+              <p:cTn id="2" dur="indefinite" nodeType="mainSeq">
+                <p:childTnLst>
+                  <p:par>
+                    <p:cTn id="3" fill="hold">
+                      <p:stCondLst>
+                        <p:cond delay="indefinite"/>
+                      </p:stCondLst>
+                      <p:childTnLst>
+                        <p:par>
+                          <p:cTn id="4" fill="hold">
+                            <p:stCondLst>
+                              <p:cond delay="0"/>
+                            </p:stCondLst>
+                            <p:childTnLst>
+                              <p:par>
+                                <p:cTn id="5" presetID="10" presetClass="entr" presetSubtype="0" fill="hold" grpId="0" nodeType="clickEffect">
+                                  <p:stCondLst>
+                                    <p:cond delay="0"/>
+                                  </p:stCondLst>
+                                  <p:childTnLst>
+                                    <p:set>
+                                      <p:cBhvr>
+                                        <p:cTn id="6" dur="1" fill="hold">
+                                          <p:stCondLst>
+                                            <p:cond delay="0"/>
+                                          </p:stCondLst>
+                                        </p:cTn>
+                                        <p:tgtEl>
+                                          <p:spTgt spid="3"/>
+                                        </p:tgtEl>
+                                        <p:attrNameLst>
+                                          <p:attrName>style.visibility</p:attrName>
+                                        </p:attrNameLst>
+                                      </p:cBhvr>
+                                      <p:to>
+                                        <p:strVal val="visible"/>
+                                      </p:to>
+                                    </p:set>
+                                    <p:animEffect transition="in" filter="fade">
+                                      <p:cBhvr>
+                                        <p:cTn id="7" dur="500"/>
+                                        <p:tgtEl>
+                                          <p:spTgt spid="3"/>
+                                        </p:tgtEl>
+                                      </p:cBhvr>
+                                    </p:animEffect>
+                                  </p:childTnLst>
+                                </p:cTn>
+                              </p:par>
+                            </p:childTnLst>
+                          </p:cTn>
+                        </p:par>
+                      </p:childTnLst>
+                    </p:cTn>
+                  </p:par>
+                </p:childTnLst>
+              </p:cTn>
+              <p:prevCondLst>
+                <p:cond evt="onPrev" delay="0">
+                  <p:tgtEl>
+                    <p:sldTgt/>
+                  </p:tgtEl>
+                </p:cond>
+              </p:prevCondLst>
+              <p:nextCondLst>
+                <p:cond evt="onNext" delay="0">
+                  <p:tgtEl>
+                    <p:sldTgt/>
+                  </p:tgtEl>
+                </p:cond>
+              </p:nextCondLst>
+            </p:seq>
+          </p:childTnLst>
+        </p:cTn>
+      </p:par>
+    </p:tnLst>
+    <p:bldLst>
+      <p:bldP spid="3" grpId="0"/>
+    </p:bldLst>
+  </p:timing>
+</p:sld>
+</file>
+
+<file path=ppt/slides/slide18.xml><?xml version="1.0" encoding="utf-8"?>
+<p:sld xmlns:a="http://schemas.openxmlformats.org/drawingml/2006/main" xmlns:r="http://schemas.openxmlformats.org/officeDocument/2006/relationships" xmlns:p="http://schemas.openxmlformats.org/presentationml/2006/main">
+  <p:cSld>
+    <p:spTree>
+      <p:nvGrpSpPr>
+        <p:cNvPr id="1" name=""/>
+        <p:cNvGrpSpPr/>
+        <p:nvPr/>
+      </p:nvGrpSpPr>
+      <p:grpSpPr>
+        <a:xfrm>
+          <a:off x="0" y="0"/>
+          <a:ext cx="0" cy="0"/>
+          <a:chOff x="0" y="0"/>
+          <a:chExt cx="0" cy="0"/>
+        </a:xfrm>
+      </p:grpSpPr>
+      <p:sp>
+        <p:nvSpPr>
+          <p:cNvPr id="2" name="Title 1"/>
+          <p:cNvSpPr>
+            <a:spLocks noGrp="1"/>
+          </p:cNvSpPr>
+          <p:nvPr>
+            <p:ph type="title"/>
+          </p:nvPr>
+        </p:nvSpPr>
+        <p:spPr>
+          <a:xfrm>
+            <a:off x="646111" y="452718"/>
+            <a:ext cx="9869489" cy="1400530"/>
+          </a:xfrm>
+        </p:spPr>
+        <p:txBody>
+          <a:bodyPr/>
+          <a:lstStyle/>
+          <a:p>
+            <a:r>
+              <a:rPr lang="en-US" dirty="0" smtClean="0"/>
+              <a:t>You’re going to need orchestration.</a:t>
+            </a:r>
+            <a:endParaRPr lang="en-US" dirty="0"/>
+          </a:p>
+        </p:txBody>
+      </p:sp>
+      <p:sp>
+        <p:nvSpPr>
+          <p:cNvPr id="3" name="TextBox 2"/>
+          <p:cNvSpPr txBox="1"/>
+          <p:nvPr/>
+        </p:nvSpPr>
+        <p:spPr>
+          <a:xfrm>
+            <a:off x="838200" y="1600200"/>
+            <a:ext cx="5715000" cy="369332"/>
+          </a:xfrm>
+          <a:prstGeom prst="rect">
+            <a:avLst/>
+          </a:prstGeom>
+          <a:noFill/>
+        </p:spPr>
+        <p:txBody>
+          <a:bodyPr wrap="square" rtlCol="0">
+            <a:spAutoFit/>
+          </a:bodyPr>
+          <a:lstStyle/>
+          <a:p>
+            <a:r>
+              <a:rPr lang="en-US" dirty="0" smtClean="0"/>
+              <a:t>Orchestration: package management for:</a:t>
+            </a:r>
+            <a:endParaRPr lang="en-US" dirty="0"/>
+          </a:p>
+        </p:txBody>
+      </p:sp>
+      <p:sp>
+        <p:nvSpPr>
+          <p:cNvPr id="4" name="TextBox 3"/>
+          <p:cNvSpPr txBox="1"/>
+          <p:nvPr/>
+        </p:nvSpPr>
+        <p:spPr>
+          <a:xfrm>
+            <a:off x="2438400" y="2667000"/>
+            <a:ext cx="4800600" cy="369332"/>
+          </a:xfrm>
+          <a:prstGeom prst="rect">
+            <a:avLst/>
+          </a:prstGeom>
+          <a:noFill/>
+        </p:spPr>
+        <p:txBody>
+          <a:bodyPr wrap="square" rtlCol="0">
+            <a:spAutoFit/>
+          </a:bodyPr>
+          <a:lstStyle/>
+          <a:p>
+            <a:pPr marL="285750" indent="-285750">
+              <a:buFont typeface="Arial" panose="020B0604020202020204" pitchFamily="34" charset="0"/>
+              <a:buChar char="•"/>
+            </a:pPr>
+            <a:r>
+              <a:rPr lang="en-US" dirty="0" smtClean="0"/>
+              <a:t>VMs and data center infrastructure</a:t>
+            </a:r>
+            <a:endParaRPr lang="en-US" dirty="0"/>
+          </a:p>
+        </p:txBody>
+      </p:sp>
+      <p:sp>
+        <p:nvSpPr>
+          <p:cNvPr id="5" name="TextBox 4"/>
+          <p:cNvSpPr txBox="1"/>
+          <p:nvPr/>
+        </p:nvSpPr>
+        <p:spPr>
+          <a:xfrm>
+            <a:off x="2461591" y="3000730"/>
+            <a:ext cx="4800600" cy="369332"/>
+          </a:xfrm>
+          <a:prstGeom prst="rect">
+            <a:avLst/>
+          </a:prstGeom>
+          <a:noFill/>
+        </p:spPr>
+        <p:txBody>
+          <a:bodyPr wrap="square" rtlCol="0">
+            <a:spAutoFit/>
+          </a:bodyPr>
+          <a:lstStyle/>
+          <a:p>
+            <a:pPr marL="285750" indent="-285750">
+              <a:buFont typeface="Arial" panose="020B0604020202020204" pitchFamily="34" charset="0"/>
+              <a:buChar char="•"/>
+            </a:pPr>
+            <a:r>
+              <a:rPr lang="en-US" dirty="0" smtClean="0"/>
+              <a:t>Containers</a:t>
+            </a:r>
+            <a:endParaRPr lang="en-US" dirty="0"/>
+          </a:p>
+        </p:txBody>
+      </p:sp>
+      <p:sp>
+        <p:nvSpPr>
+          <p:cNvPr id="6" name="TextBox 5"/>
+          <p:cNvSpPr txBox="1"/>
+          <p:nvPr/>
+        </p:nvSpPr>
+        <p:spPr>
+          <a:xfrm>
+            <a:off x="2461591" y="3364468"/>
+            <a:ext cx="4800600" cy="369332"/>
+          </a:xfrm>
+          <a:prstGeom prst="rect">
+            <a:avLst/>
+          </a:prstGeom>
+          <a:noFill/>
+        </p:spPr>
+        <p:txBody>
+          <a:bodyPr wrap="square" rtlCol="0">
+            <a:spAutoFit/>
+          </a:bodyPr>
+          <a:lstStyle/>
+          <a:p>
+            <a:pPr marL="285750" indent="-285750">
+              <a:buFont typeface="Arial" panose="020B0604020202020204" pitchFamily="34" charset="0"/>
+              <a:buChar char="•"/>
+            </a:pPr>
+            <a:r>
+              <a:rPr lang="en-US" dirty="0" smtClean="0"/>
+              <a:t>Apps </a:t>
+            </a:r>
+            <a:endParaRPr lang="en-US" dirty="0"/>
+          </a:p>
+        </p:txBody>
+      </p:sp>
+    </p:spTree>
+    <p:extLst>
+      <p:ext uri="{BB962C8B-B14F-4D97-AF65-F5344CB8AC3E}">
+        <p14:creationId xmlns:p14="http://schemas.microsoft.com/office/powerpoint/2010/main" val="4250035251"/>
+      </p:ext>
+    </p:extLst>
+  </p:cSld>
+  <p:clrMapOvr>
+    <a:masterClrMapping/>
+  </p:clrMapOvr>
+  <mc:AlternateContent xmlns:mc="http://schemas.openxmlformats.org/markup-compatibility/2006">
+    <mc:Choice xmlns:p14="http://schemas.microsoft.com/office/powerpoint/2010/main" Requires="p14">
+      <p:transition spd="med" p14:dur="700">
+        <p:fade/>
+      </p:transition>
+    </mc:Choice>
+    <mc:Fallback>
+      <p:transition spd="med">
+        <p:fade/>
+      </p:transition>
+    </mc:Fallback>
+  </mc:AlternateContent>
+  <p:timing>
+    <p:tnLst>
+      <p:par>
+        <p:cTn id="1" dur="indefinite" restart="never" nodeType="tmRoot">
+          <p:childTnLst>
+            <p:seq concurrent="1" nextAc="seek">
+              <p:cTn id="2" dur="indefinite" nodeType="mainSeq">
+                <p:childTnLst>
+                  <p:par>
+                    <p:cTn id="3" fill="hold">
+                      <p:stCondLst>
+                        <p:cond delay="indefinite"/>
+                      </p:stCondLst>
+                      <p:childTnLst>
+                        <p:par>
+                          <p:cTn id="4" fill="hold">
+                            <p:stCondLst>
+                              <p:cond delay="0"/>
+                            </p:stCondLst>
+                            <p:childTnLst>
+                              <p:par>
+                                <p:cTn id="5" presetID="10" presetClass="entr" presetSubtype="0" fill="hold" grpId="0" nodeType="clickEffect">
+                                  <p:stCondLst>
+                                    <p:cond delay="0"/>
+                                  </p:stCondLst>
+                                  <p:childTnLst>
+                                    <p:set>
+                                      <p:cBhvr>
+                                        <p:cTn id="6" dur="1" fill="hold">
+                                          <p:stCondLst>
+                                            <p:cond delay="0"/>
+                                          </p:stCondLst>
+                                        </p:cTn>
+                                        <p:tgtEl>
+                                          <p:spTgt spid="4"/>
+                                        </p:tgtEl>
+                                        <p:attrNameLst>
+                                          <p:attrName>style.visibility</p:attrName>
+                                        </p:attrNameLst>
+                                      </p:cBhvr>
+                                      <p:to>
+                                        <p:strVal val="visible"/>
+                                      </p:to>
+                                    </p:set>
+                                    <p:animEffect transition="in" filter="fade">
+                                      <p:cBhvr>
+                                        <p:cTn id="7" dur="500"/>
+                                        <p:tgtEl>
+                                          <p:spTgt spid="4"/>
+                                        </p:tgtEl>
+                                      </p:cBhvr>
+                                    </p:animEffect>
+                                  </p:childTnLst>
+                                </p:cTn>
+                              </p:par>
+                            </p:childTnLst>
+                          </p:cTn>
+                        </p:par>
+                      </p:childTnLst>
+                    </p:cTn>
+                  </p:par>
+                  <p:par>
+                    <p:cTn id="8" fill="hold">
+                      <p:stCondLst>
+                        <p:cond delay="indefinite"/>
+                      </p:stCondLst>
+                      <p:childTnLst>
+                        <p:par>
+                          <p:cTn id="9" fill="hold">
+                            <p:stCondLst>
+                              <p:cond delay="0"/>
+                            </p:stCondLst>
+                            <p:childTnLst>
+                              <p:par>
+                                <p:cTn id="10" presetID="10" presetClass="entr" presetSubtype="0" fill="hold" grpId="0" nodeType="clickEffect">
+                                  <p:stCondLst>
+                                    <p:cond delay="0"/>
+                                  </p:stCondLst>
+                                  <p:childTnLst>
+                                    <p:set>
+                                      <p:cBhvr>
+                                        <p:cTn id="11" dur="1" fill="hold">
+                                          <p:stCondLst>
+                                            <p:cond delay="0"/>
+                                          </p:stCondLst>
+                                        </p:cTn>
+                                        <p:tgtEl>
+                                          <p:spTgt spid="5"/>
+                                        </p:tgtEl>
+                                        <p:attrNameLst>
+                                          <p:attrName>style.visibility</p:attrName>
+                                        </p:attrNameLst>
+                                      </p:cBhvr>
+                                      <p:to>
+                                        <p:strVal val="visible"/>
+                                      </p:to>
+                                    </p:set>
+                                    <p:animEffect transition="in" filter="fade">
+                                      <p:cBhvr>
+                                        <p:cTn id="12" dur="500"/>
+                                        <p:tgtEl>
+                                          <p:spTgt spid="5"/>
+                                        </p:tgtEl>
+                                      </p:cBhvr>
+                                    </p:animEffect>
+                                  </p:childTnLst>
+                                </p:cTn>
+                              </p:par>
+                            </p:childTnLst>
+                          </p:cTn>
+                        </p:par>
+                      </p:childTnLst>
+                    </p:cTn>
+                  </p:par>
+                  <p:par>
+                    <p:cTn id="13" fill="hold">
+                      <p:stCondLst>
+                        <p:cond delay="indefinite"/>
+                      </p:stCondLst>
+                      <p:childTnLst>
+                        <p:par>
+                          <p:cTn id="14" fill="hold">
+                            <p:stCondLst>
+                              <p:cond delay="0"/>
+                            </p:stCondLst>
+                            <p:childTnLst>
+                              <p:par>
+                                <p:cTn id="15" presetID="10" presetClass="entr" presetSubtype="0" fill="hold" grpId="0" nodeType="clickEffect">
+                                  <p:stCondLst>
+                                    <p:cond delay="0"/>
+                                  </p:stCondLst>
+                                  <p:childTnLst>
+                                    <p:set>
+                                      <p:cBhvr>
+                                        <p:cTn id="16" dur="1" fill="hold">
+                                          <p:stCondLst>
+                                            <p:cond delay="0"/>
+                                          </p:stCondLst>
+                                        </p:cTn>
+                                        <p:tgtEl>
+                                          <p:spTgt spid="6"/>
+                                        </p:tgtEl>
+                                        <p:attrNameLst>
+                                          <p:attrName>style.visibility</p:attrName>
+                                        </p:attrNameLst>
+                                      </p:cBhvr>
+                                      <p:to>
+                                        <p:strVal val="visible"/>
+                                      </p:to>
+                                    </p:set>
+                                    <p:animEffect transition="in" filter="fade">
+                                      <p:cBhvr>
+                                        <p:cTn id="17" dur="500"/>
+                                        <p:tgtEl>
+                                          <p:spTgt spid="6"/>
+                                        </p:tgtEl>
+                                      </p:cBhvr>
+                                    </p:animEffect>
+                                  </p:childTnLst>
+                                </p:cTn>
+                              </p:par>
+                            </p:childTnLst>
+                          </p:cTn>
+                        </p:par>
+                      </p:childTnLst>
+                    </p:cTn>
+                  </p:par>
+                </p:childTnLst>
+              </p:cTn>
+              <p:prevCondLst>
+                <p:cond evt="onPrev" delay="0">
+                  <p:tgtEl>
+                    <p:sldTgt/>
+                  </p:tgtEl>
+                </p:cond>
+              </p:prevCondLst>
+              <p:nextCondLst>
+                <p:cond evt="onNext" delay="0">
+                  <p:tgtEl>
+                    <p:sldTgt/>
+                  </p:tgtEl>
+                </p:cond>
+              </p:nextCondLst>
+            </p:seq>
+          </p:childTnLst>
+        </p:cTn>
+      </p:par>
+    </p:tnLst>
+    <p:bldLst>
+      <p:bldP spid="4" grpId="0"/>
+      <p:bldP spid="5" grpId="0"/>
+      <p:bldP spid="6" grpId="0"/>
+    </p:bldLst>
+  </p:timing>
+</p:sld>
+</file>
+
+<file path=ppt/slides/slide19.xml><?xml version="1.0" encoding="utf-8"?>
+<p:sld xmlns:a="http://schemas.openxmlformats.org/drawingml/2006/main" xmlns:r="http://schemas.openxmlformats.org/officeDocument/2006/relationships" xmlns:p="http://schemas.openxmlformats.org/presentationml/2006/main">
+  <p:cSld>
+    <p:spTree>
+      <p:nvGrpSpPr>
+        <p:cNvPr id="1" name=""/>
+        <p:cNvGrpSpPr/>
+        <p:nvPr/>
+      </p:nvGrpSpPr>
+      <p:grpSpPr>
+        <a:xfrm>
+          <a:off x="0" y="0"/>
+          <a:ext cx="0" cy="0"/>
+          <a:chOff x="0" y="0"/>
+          <a:chExt cx="0" cy="0"/>
+        </a:xfrm>
+      </p:grpSpPr>
+      <p:sp>
+        <p:nvSpPr>
+          <p:cNvPr id="2" name="Title 1"/>
+          <p:cNvSpPr>
+            <a:spLocks noGrp="1"/>
+          </p:cNvSpPr>
+          <p:nvPr>
+            <p:ph type="title"/>
+          </p:nvPr>
+        </p:nvSpPr>
+        <p:spPr/>
+        <p:txBody>
+          <a:bodyPr/>
+          <a:lstStyle/>
+          <a:p>
+            <a:r>
+              <a:rPr lang="en-US" dirty="0" smtClean="0"/>
               <a:t>Questions? We could talk in detail for hours….</a:t>
             </a:r>
             <a:endParaRPr lang="en-US" dirty="0"/>
@@ -10833,7 +12085,126 @@
 </p:sld>
 </file>
 
-<file path=ppt/slides/slide16.xml><?xml version="1.0" encoding="utf-8"?>
+<file path=ppt/slides/slide2.xml><?xml version="1.0" encoding="utf-8"?>
+<p:sld xmlns:a="http://schemas.openxmlformats.org/drawingml/2006/main" xmlns:r="http://schemas.openxmlformats.org/officeDocument/2006/relationships" xmlns:p="http://schemas.openxmlformats.org/presentationml/2006/main">
+  <p:cSld>
+    <p:spTree>
+      <p:nvGrpSpPr>
+        <p:cNvPr id="1" name=""/>
+        <p:cNvGrpSpPr/>
+        <p:nvPr/>
+      </p:nvGrpSpPr>
+      <p:grpSpPr>
+        <a:xfrm>
+          <a:off x="0" y="0"/>
+          <a:ext cx="0" cy="0"/>
+          <a:chOff x="0" y="0"/>
+          <a:chExt cx="0" cy="0"/>
+        </a:xfrm>
+      </p:grpSpPr>
+      <p:sp>
+        <p:nvSpPr>
+          <p:cNvPr id="2" name="Title 1"/>
+          <p:cNvSpPr>
+            <a:spLocks noGrp="1"/>
+          </p:cNvSpPr>
+          <p:nvPr>
+            <p:ph type="title"/>
+          </p:nvPr>
+        </p:nvSpPr>
+        <p:spPr/>
+        <p:txBody>
+          <a:bodyPr/>
+          <a:lstStyle/>
+          <a:p>
+            <a:r>
+              <a:rPr lang="en-US" dirty="0" smtClean="0"/>
+              <a:t>The Agenda</a:t>
+            </a:r>
+            <a:endParaRPr lang="en-US" dirty="0"/>
+          </a:p>
+        </p:txBody>
+      </p:sp>
+      <p:sp>
+        <p:nvSpPr>
+          <p:cNvPr id="3" name="Content Placeholder 2"/>
+          <p:cNvSpPr>
+            <a:spLocks noGrp="1"/>
+          </p:cNvSpPr>
+          <p:nvPr>
+            <p:ph idx="1"/>
+          </p:nvPr>
+        </p:nvSpPr>
+        <p:spPr/>
+        <p:txBody>
+          <a:bodyPr/>
+          <a:lstStyle/>
+          <a:p>
+            <a:r>
+              <a:rPr lang="en-US" dirty="0" smtClean="0"/>
+              <a:t>Two minutes on the history of Virtualization. OK, three.</a:t>
+            </a:r>
+          </a:p>
+          <a:p>
+            <a:r>
+              <a:rPr lang="en-US" dirty="0" smtClean="0"/>
+              <a:t>Why Docker Rocks</a:t>
+            </a:r>
+          </a:p>
+          <a:p>
+            <a:r>
+              <a:rPr lang="en-US" dirty="0" smtClean="0"/>
+              <a:t>Docker on Azure</a:t>
+            </a:r>
+          </a:p>
+          <a:p>
+            <a:r>
+              <a:rPr lang="en-US" dirty="0" smtClean="0"/>
+              <a:t>Other Containers on Azure</a:t>
+            </a:r>
+          </a:p>
+          <a:p>
+            <a:r>
+              <a:rPr lang="en-US" dirty="0" smtClean="0"/>
+              <a:t>Questions?</a:t>
+            </a:r>
+            <a:endParaRPr lang="en-US" dirty="0"/>
+          </a:p>
+        </p:txBody>
+      </p:sp>
+    </p:spTree>
+    <p:extLst>
+      <p:ext uri="{BB962C8B-B14F-4D97-AF65-F5344CB8AC3E}">
+        <p14:creationId xmlns:p14="http://schemas.microsoft.com/office/powerpoint/2010/main" val="682195269"/>
+      </p:ext>
+    </p:extLst>
+  </p:cSld>
+  <p:clrMapOvr>
+    <a:masterClrMapping/>
+  </p:clrMapOvr>
+  <mc:AlternateContent xmlns:mc="http://schemas.openxmlformats.org/markup-compatibility/2006" xmlns:p14="http://schemas.microsoft.com/office/powerpoint/2010/main">
+    <mc:Choice Requires="p14">
+      <p:transition spd="med" p14:dur="700">
+        <p:fade/>
+      </p:transition>
+    </mc:Choice>
+    <mc:Fallback xmlns="">
+      <p:transition spd="med">
+        <p:fade/>
+      </p:transition>
+    </mc:Fallback>
+  </mc:AlternateContent>
+  <p:timing>
+    <p:tnLst>
+      <p:par>
+        <p:cTn id="1" dur="indefinite" restart="never" nodeType="tmRoot"/>
+      </p:par>
+    </p:tnLst>
+  </p:timing>
+</p:sld>
+</file>
+
+<file path=ppt/slides/slide20.xml><?xml version="1.0" encoding="utf-8"?>
 <p:sld xmlns:a="http://schemas.openxmlformats.org/drawingml/2006/main" xmlns:r="http://schemas.openxmlformats.org/officeDocument/2006/relationships" xmlns:p="http://schemas.openxmlformats.org/presentationml/2006/main">
   <p:cSld>
     <p:spTree>
@@ -10882,7 +12253,7 @@
 </p:sld>
 </file>
 
-<file path=ppt/slides/slide17.xml><?xml version="1.0" encoding="utf-8"?>
+<file path=ppt/slides/slide21.xml><?xml version="1.0" encoding="utf-8"?>
 <p:sld xmlns:a="http://schemas.openxmlformats.org/drawingml/2006/main" xmlns:r="http://schemas.openxmlformats.org/officeDocument/2006/relationships" xmlns:p="http://schemas.openxmlformats.org/presentationml/2006/main">
   <p:cSld>
     <p:spTree>
@@ -10988,7 +12359,7 @@
 </p:sld>
 </file>
 
-<file path=ppt/slides/slide18.xml><?xml version="1.0" encoding="utf-8"?>
+<file path=ppt/slides/slide22.xml><?xml version="1.0" encoding="utf-8"?>
 <p:sld xmlns:a="http://schemas.openxmlformats.org/drawingml/2006/main" xmlns:r="http://schemas.openxmlformats.org/officeDocument/2006/relationships" xmlns:p="http://schemas.openxmlformats.org/presentationml/2006/main">
   <p:cSld>
     <p:spTree>
@@ -11059,118 +12430,6 @@
     <p:extLst>
       <p:ext uri="{BB962C8B-B14F-4D97-AF65-F5344CB8AC3E}">
         <p14:creationId xmlns:p14="http://schemas.microsoft.com/office/powerpoint/2010/main" val="2521986180"/>
-      </p:ext>
-    </p:extLst>
-  </p:cSld>
-  <p:clrMapOvr>
-    <a:masterClrMapping/>
-  </p:clrMapOvr>
-  <mc:AlternateContent xmlns:mc="http://schemas.openxmlformats.org/markup-compatibility/2006" xmlns:p14="http://schemas.microsoft.com/office/powerpoint/2010/main">
-    <mc:Choice Requires="p14">
-      <p:transition spd="med" p14:dur="700">
-        <p:fade/>
-      </p:transition>
-    </mc:Choice>
-    <mc:Fallback xmlns="">
-      <p:transition spd="med">
-        <p:fade/>
-      </p:transition>
-    </mc:Fallback>
-  </mc:AlternateContent>
-</p:sld>
-</file>
-
-<file path=ppt/slides/slide2.xml><?xml version="1.0" encoding="utf-8"?>
-<p:sld xmlns:a="http://schemas.openxmlformats.org/drawingml/2006/main" xmlns:r="http://schemas.openxmlformats.org/officeDocument/2006/relationships" xmlns:p="http://schemas.openxmlformats.org/presentationml/2006/main">
-  <p:cSld>
-    <p:spTree>
-      <p:nvGrpSpPr>
-        <p:cNvPr id="1" name=""/>
-        <p:cNvGrpSpPr/>
-        <p:nvPr/>
-      </p:nvGrpSpPr>
-      <p:grpSpPr>
-        <a:xfrm>
-          <a:off x="0" y="0"/>
-          <a:ext cx="0" cy="0"/>
-          <a:chOff x="0" y="0"/>
-          <a:chExt cx="0" cy="0"/>
-        </a:xfrm>
-      </p:grpSpPr>
-      <p:sp>
-        <p:nvSpPr>
-          <p:cNvPr id="2" name="Title 1"/>
-          <p:cNvSpPr>
-            <a:spLocks noGrp="1"/>
-          </p:cNvSpPr>
-          <p:nvPr>
-            <p:ph type="title"/>
-          </p:nvPr>
-        </p:nvSpPr>
-        <p:spPr/>
-        <p:txBody>
-          <a:bodyPr/>
-          <a:lstStyle/>
-          <a:p>
-            <a:r>
-              <a:rPr lang="en-US" dirty="0" smtClean="0"/>
-              <a:t>The Agenda</a:t>
-            </a:r>
-            <a:endParaRPr lang="en-US" dirty="0"/>
-          </a:p>
-        </p:txBody>
-      </p:sp>
-      <p:sp>
-        <p:nvSpPr>
-          <p:cNvPr id="3" name="Content Placeholder 2"/>
-          <p:cNvSpPr>
-            <a:spLocks noGrp="1"/>
-          </p:cNvSpPr>
-          <p:nvPr>
-            <p:ph idx="1"/>
-          </p:nvPr>
-        </p:nvSpPr>
-        <p:spPr/>
-        <p:txBody>
-          <a:bodyPr/>
-          <a:lstStyle/>
-          <a:p>
-            <a:r>
-              <a:rPr lang="en-US" dirty="0" smtClean="0"/>
-              <a:t>Two minutes on the history of Virtualization. OK, three.</a:t>
-            </a:r>
-          </a:p>
-          <a:p>
-            <a:r>
-              <a:rPr lang="en-US" dirty="0" smtClean="0"/>
-              <a:t>Why Docker Rocks</a:t>
-            </a:r>
-          </a:p>
-          <a:p>
-            <a:r>
-              <a:rPr lang="en-US" dirty="0" smtClean="0"/>
-              <a:t>Docker on Azure</a:t>
-            </a:r>
-          </a:p>
-          <a:p>
-            <a:r>
-              <a:rPr lang="en-US" dirty="0" smtClean="0"/>
-              <a:t>Other Containers on Azure</a:t>
-            </a:r>
-          </a:p>
-          <a:p>
-            <a:r>
-              <a:rPr lang="en-US" dirty="0" smtClean="0"/>
-              <a:t>Questions?</a:t>
-            </a:r>
-            <a:endParaRPr lang="en-US" dirty="0"/>
-          </a:p>
-        </p:txBody>
-      </p:sp>
-    </p:spTree>
-    <p:extLst>
-      <p:ext uri="{BB962C8B-B14F-4D97-AF65-F5344CB8AC3E}">
-        <p14:creationId xmlns:p14="http://schemas.microsoft.com/office/powerpoint/2010/main" val="682195269"/>
       </p:ext>
     </p:extLst>
   </p:cSld>

</xml_diff>

<commit_message>
finishing off the decks now; adding Hoop for actor
</commit_message>
<xml_diff>
--- a/Containers and Clusters in Azure.pptx
+++ b/Containers and Clusters in Azure.pptx
@@ -21,18 +21,18 @@
     <p:sldId id="269" r:id="rId10"/>
     <p:sldId id="275" r:id="rId11"/>
     <p:sldId id="260" r:id="rId12"/>
-    <p:sldId id="261" r:id="rId13"/>
-    <p:sldId id="262" r:id="rId14"/>
-    <p:sldId id="263" r:id="rId15"/>
-    <p:sldId id="274" r:id="rId16"/>
-    <p:sldId id="276" r:id="rId17"/>
-    <p:sldId id="277" r:id="rId18"/>
-    <p:sldId id="278" r:id="rId19"/>
-    <p:sldId id="279" r:id="rId20"/>
-    <p:sldId id="270" r:id="rId21"/>
-    <p:sldId id="264" r:id="rId22"/>
-    <p:sldId id="265" r:id="rId23"/>
-    <p:sldId id="266" r:id="rId24"/>
+    <p:sldId id="274" r:id="rId13"/>
+    <p:sldId id="276" r:id="rId14"/>
+    <p:sldId id="277" r:id="rId15"/>
+    <p:sldId id="278" r:id="rId16"/>
+    <p:sldId id="279" r:id="rId17"/>
+    <p:sldId id="280" r:id="rId18"/>
+    <p:sldId id="270" r:id="rId19"/>
+    <p:sldId id="264" r:id="rId20"/>
+    <p:sldId id="265" r:id="rId21"/>
+    <p:sldId id="281" r:id="rId22"/>
+    <p:sldId id="282" r:id="rId23"/>
+    <p:sldId id="283" r:id="rId24"/>
   </p:sldIdLst>
   <p:sldSz cx="12192000" cy="6858000"/>
   <p:notesSz cx="6858000" cy="9144000"/>
@@ -132,6 +132,43 @@
     </a:lvl9pPr>
   </p:defaultTextStyle>
   <p:extLst>
+    <p:ext uri="{521415D9-36F7-43E2-AB2F-B90AF26B5E84}">
+      <p14:sectionLst xmlns:p14="http://schemas.microsoft.com/office/powerpoint/2010/main">
+        <p14:section name="Default Section" id="{D8BC3675-9629-41E7-8971-A2C06176DF3A}">
+          <p14:sldIdLst>
+            <p14:sldId id="256"/>
+            <p14:sldId id="257"/>
+            <p14:sldId id="258"/>
+            <p14:sldId id="267"/>
+            <p14:sldId id="268"/>
+            <p14:sldId id="259"/>
+            <p14:sldId id="273"/>
+            <p14:sldId id="269"/>
+            <p14:sldId id="275"/>
+            <p14:sldId id="260"/>
+            <p14:sldId id="274"/>
+            <p14:sldId id="276"/>
+            <p14:sldId id="277"/>
+            <p14:sldId id="278"/>
+            <p14:sldId id="279"/>
+            <p14:sldId id="280"/>
+            <p14:sldId id="270"/>
+            <p14:sldId id="264"/>
+          </p14:sldIdLst>
+        </p14:section>
+        <p14:section name="Mesos Demo" id="{044D6969-96BD-4FDA-846A-92EC402F260E}">
+          <p14:sldIdLst>
+            <p14:sldId id="265"/>
+            <p14:sldId id="281"/>
+            <p14:sldId id="282"/>
+            <p14:sldId id="283"/>
+          </p14:sldIdLst>
+        </p14:section>
+        <p14:section name="Untitled Section" id="{AAD43072-7713-446C-BFC5-968D9EFFC01B}">
+          <p14:sldIdLst/>
+        </p14:section>
+      </p14:sectionLst>
+    </p:ext>
     <p:ext uri="{EFAFB233-063F-42B5-8137-9DF3F51BA10A}">
       <p15:sldGuideLst xmlns:p15="http://schemas.microsoft.com/office/powerpoint/2012/main"/>
     </p:ext>
@@ -3183,7 +3220,7 @@
           <a:p>
             <a:fld id="{061C5132-FFA3-4B02-9F09-22FCF40EFA74}" type="datetimeFigureOut">
               <a:rPr lang="en-US" smtClean="0"/>
-              <a:t>5/7/2015</a:t>
+              <a:t>5/9/2015</a:t>
             </a:fld>
             <a:endParaRPr lang="en-US"/>
           </a:p>
@@ -3348,7 +3385,7 @@
           <a:p>
             <a:fld id="{0B6E42C9-243F-4DC5-AFF6-9D56B5FA9D63}" type="datetimeFigureOut">
               <a:rPr lang="en-US" smtClean="0"/>
-              <a:t>5/7/2015</a:t>
+              <a:t>5/9/2015</a:t>
             </a:fld>
             <a:endParaRPr lang="en-US"/>
           </a:p>
@@ -3802,7 +3839,7 @@
           <a:p>
             <a:fld id="{4AAD347D-5ACD-4C99-B74B-A9C85AD731AF}" type="datetimeFigureOut">
               <a:rPr lang="en-US" dirty="0"/>
-              <a:t>5/8/2015</a:t>
+              <a:t>5/9/2015</a:t>
             </a:fld>
             <a:endParaRPr lang="en-US" dirty="0"/>
           </a:p>
@@ -4097,7 +4134,7 @@
             <a:fld id="{B0FE2824-C2A0-4931-BB32-60B24BDBB3CC}" type="datetimeFigureOut">
               <a:rPr lang="en-US" smtClean="0"/>
               <a:pPr/>
-              <a:t>5/7/2015</a:t>
+              <a:t>5/9/2015</a:t>
             </a:fld>
             <a:endParaRPr lang="en-US"/>
           </a:p>
@@ -4293,7 +4330,7 @@
             <a:fld id="{B0FE2824-C2A0-4931-BB32-60B24BDBB3CC}" type="datetimeFigureOut">
               <a:rPr lang="en-US" smtClean="0"/>
               <a:pPr/>
-              <a:t>5/7/2015</a:t>
+              <a:t>5/9/2015</a:t>
             </a:fld>
             <a:endParaRPr lang="en-US"/>
           </a:p>
@@ -4568,7 +4605,7 @@
             <a:fld id="{B0FE2824-C2A0-4931-BB32-60B24BDBB3CC}" type="datetimeFigureOut">
               <a:rPr lang="en-US" smtClean="0"/>
               <a:pPr/>
-              <a:t>5/7/2015</a:t>
+              <a:t>5/9/2015</a:t>
             </a:fld>
             <a:endParaRPr lang="en-US"/>
           </a:p>
@@ -4911,7 +4948,7 @@
             <a:fld id="{B0FE2824-C2A0-4931-BB32-60B24BDBB3CC}" type="datetimeFigureOut">
               <a:rPr lang="en-US" smtClean="0"/>
               <a:pPr/>
-              <a:t>5/7/2015</a:t>
+              <a:t>5/9/2015</a:t>
             </a:fld>
             <a:endParaRPr lang="en-US"/>
           </a:p>
@@ -5536,7 +5573,7 @@
             <a:fld id="{B0FE2824-C2A0-4931-BB32-60B24BDBB3CC}" type="datetimeFigureOut">
               <a:rPr lang="en-US" smtClean="0"/>
               <a:pPr/>
-              <a:t>5/7/2015</a:t>
+              <a:t>5/9/2015</a:t>
             </a:fld>
             <a:endParaRPr lang="en-US"/>
           </a:p>
@@ -6398,7 +6435,7 @@
             <a:fld id="{B0FE2824-C2A0-4931-BB32-60B24BDBB3CC}" type="datetimeFigureOut">
               <a:rPr lang="en-US" smtClean="0"/>
               <a:pPr/>
-              <a:t>5/7/2015</a:t>
+              <a:t>5/9/2015</a:t>
             </a:fld>
             <a:endParaRPr lang="en-US"/>
           </a:p>
@@ -6569,7 +6606,7 @@
           <a:p>
             <a:fld id="{B0FE2824-C2A0-4931-BB32-60B24BDBB3CC}" type="datetimeFigureOut">
               <a:rPr lang="en-US" smtClean="0"/>
-              <a:t>5/7/2015</a:t>
+              <a:t>5/9/2015</a:t>
             </a:fld>
             <a:endParaRPr lang="en-US"/>
           </a:p>
@@ -6768,7 +6805,7 @@
           <a:p>
             <a:fld id="{B0FE2824-C2A0-4931-BB32-60B24BDBB3CC}" type="datetimeFigureOut">
               <a:rPr lang="en-US" smtClean="0"/>
-              <a:t>5/7/2015</a:t>
+              <a:t>5/9/2015</a:t>
             </a:fld>
             <a:endParaRPr lang="en-US"/>
           </a:p>
@@ -6957,7 +6994,7 @@
           <a:p>
             <a:fld id="{B0FE2824-C2A0-4931-BB32-60B24BDBB3CC}" type="datetimeFigureOut">
               <a:rPr lang="en-US" smtClean="0"/>
-              <a:t>5/7/2015</a:t>
+              <a:t>5/9/2015</a:t>
             </a:fld>
             <a:endParaRPr lang="en-US"/>
           </a:p>
@@ -7223,7 +7260,7 @@
           <a:p>
             <a:fld id="{9796027F-7875-4030-9381-8BD8C4F21935}" type="datetimeFigureOut">
               <a:rPr lang="en-US" dirty="0"/>
-              <a:t>5/8/2015</a:t>
+              <a:t>5/9/2015</a:t>
             </a:fld>
             <a:endParaRPr lang="en-US" dirty="0"/>
           </a:p>
@@ -7534,7 +7571,7 @@
           <a:p>
             <a:fld id="{B0FE2824-C2A0-4931-BB32-60B24BDBB3CC}" type="datetimeFigureOut">
               <a:rPr lang="en-US" smtClean="0"/>
-              <a:t>5/7/2015</a:t>
+              <a:t>5/9/2015</a:t>
             </a:fld>
             <a:endParaRPr lang="en-US"/>
           </a:p>
@@ -7997,7 +8034,7 @@
           <a:p>
             <a:fld id="{B0FE2824-C2A0-4931-BB32-60B24BDBB3CC}" type="datetimeFigureOut">
               <a:rPr lang="en-US" smtClean="0"/>
-              <a:t>5/7/2015</a:t>
+              <a:t>5/9/2015</a:t>
             </a:fld>
             <a:endParaRPr lang="en-US"/>
           </a:p>
@@ -8134,7 +8171,7 @@
           <a:p>
             <a:fld id="{B0FE2824-C2A0-4931-BB32-60B24BDBB3CC}" type="datetimeFigureOut">
               <a:rPr lang="en-US" smtClean="0"/>
-              <a:t>5/7/2015</a:t>
+              <a:t>5/9/2015</a:t>
             </a:fld>
             <a:endParaRPr lang="en-US"/>
           </a:p>
@@ -8248,7 +8285,7 @@
           <a:p>
             <a:fld id="{B0FE2824-C2A0-4931-BB32-60B24BDBB3CC}" type="datetimeFigureOut">
               <a:rPr lang="en-US" smtClean="0"/>
-              <a:t>5/7/2015</a:t>
+              <a:t>5/9/2015</a:t>
             </a:fld>
             <a:endParaRPr lang="en-US"/>
           </a:p>
@@ -8546,7 +8583,7 @@
           <a:p>
             <a:fld id="{B0FE2824-C2A0-4931-BB32-60B24BDBB3CC}" type="datetimeFigureOut">
               <a:rPr lang="en-US" smtClean="0"/>
-              <a:t>5/7/2015</a:t>
+              <a:t>5/9/2015</a:t>
             </a:fld>
             <a:endParaRPr lang="en-US"/>
           </a:p>
@@ -8840,7 +8877,7 @@
           <a:p>
             <a:fld id="{B0FE2824-C2A0-4931-BB32-60B24BDBB3CC}" type="datetimeFigureOut">
               <a:rPr lang="en-US" smtClean="0"/>
-              <a:t>5/7/2015</a:t>
+              <a:t>5/9/2015</a:t>
             </a:fld>
             <a:endParaRPr lang="en-US"/>
           </a:p>
@@ -9289,7 +9326,7 @@
             <a:fld id="{B0FE2824-C2A0-4931-BB32-60B24BDBB3CC}" type="datetimeFigureOut">
               <a:rPr lang="en-US" smtClean="0"/>
               <a:pPr/>
-              <a:t>5/7/2015</a:t>
+              <a:t>5/9/2015</a:t>
             </a:fld>
             <a:endParaRPr lang="en-US"/>
           </a:p>
@@ -10144,7 +10181,15 @@
           <a:p>
             <a:r>
               <a:rPr lang="en-US" dirty="0" smtClean="0"/>
-              <a:t>Docker at Microsoft</a:t>
+              <a:t>What it DOES mean: </a:t>
+            </a:r>
+            <a:r>
+              <a:rPr lang="en-US" dirty="0" err="1" smtClean="0"/>
+              <a:t>Microservices</a:t>
+            </a:r>
+            <a:r>
+              <a:rPr lang="en-US" dirty="0" smtClean="0"/>
+              <a:t> architectures…</a:t>
             </a:r>
             <a:endParaRPr lang="en-US" dirty="0"/>
           </a:p>
@@ -10152,23 +10197,26 @@
       </p:sp>
       <p:sp>
         <p:nvSpPr>
-          <p:cNvPr id="3" name="Text Placeholder 2"/>
-          <p:cNvSpPr>
-            <a:spLocks noGrp="1"/>
-          </p:cNvSpPr>
-          <p:nvPr>
-            <p:ph type="body" idx="1"/>
-          </p:nvPr>
-        </p:nvSpPr>
-        <p:spPr/>
-        <p:txBody>
-          <a:bodyPr/>
+          <p:cNvPr id="3" name="TextBox 2"/>
+          <p:cNvSpPr txBox="1"/>
+          <p:nvPr/>
+        </p:nvSpPr>
+        <p:spPr>
+          <a:xfrm>
+            <a:off x="762000" y="2286000"/>
+            <a:ext cx="10591800" cy="3657600"/>
+          </a:xfrm>
+          <a:prstGeom prst="rect">
+            <a:avLst/>
+          </a:prstGeom>
+          <a:noFill/>
+        </p:spPr>
+        <p:txBody>
+          <a:bodyPr wrap="square" rtlCol="0">
+            <a:spAutoFit/>
+          </a:bodyPr>
           <a:lstStyle/>
           <a:p>
-            <a:r>
-              <a:rPr lang="en-US" dirty="0" smtClean="0"/>
-              <a:t>This is more than just Azure</a:t>
-            </a:r>
             <a:endParaRPr lang="en-US" dirty="0"/>
           </a:p>
         </p:txBody>
@@ -10176,7 +10224,7 @@
     </p:spTree>
     <p:extLst>
       <p:ext uri="{BB962C8B-B14F-4D97-AF65-F5344CB8AC3E}">
-        <p14:creationId xmlns:p14="http://schemas.microsoft.com/office/powerpoint/2010/main" val="1783796071"/>
+        <p14:creationId xmlns:p14="http://schemas.microsoft.com/office/powerpoint/2010/main" val="160338960"/>
       </p:ext>
     </p:extLst>
   </p:cSld>
@@ -10239,7 +10287,15 @@
           <a:p>
             <a:r>
               <a:rPr lang="en-US" dirty="0" smtClean="0"/>
-              <a:t>Docker at Microsoft</a:t>
+              <a:t>What do </a:t>
+            </a:r>
+            <a:r>
+              <a:rPr lang="en-US" dirty="0" err="1" smtClean="0"/>
+              <a:t>Microservices</a:t>
+            </a:r>
+            <a:r>
+              <a:rPr lang="en-US" dirty="0" smtClean="0"/>
+              <a:t> mean? </a:t>
             </a:r>
             <a:endParaRPr lang="en-US" dirty="0"/>
           </a:p>
@@ -10247,14 +10303,14 @@
       </p:sp>
       <p:sp>
         <p:nvSpPr>
-          <p:cNvPr id="9" name="TextBox 8"/>
+          <p:cNvPr id="3" name="TextBox 2"/>
           <p:cNvSpPr txBox="1"/>
           <p:nvPr/>
         </p:nvSpPr>
         <p:spPr>
           <a:xfrm>
-            <a:off x="990600" y="2133600"/>
-            <a:ext cx="9448800" cy="3693319"/>
+            <a:off x="838200" y="2209800"/>
+            <a:ext cx="7239000" cy="369332"/>
           </a:xfrm>
           <a:prstGeom prst="rect">
             <a:avLst/>
@@ -10267,187 +10323,159 @@
           </a:bodyPr>
           <a:lstStyle/>
           <a:p>
-            <a:pPr marL="285750" indent="-285750">
-              <a:buFont typeface="Arial" panose="020B0604020202020204" pitchFamily="34" charset="0"/>
-              <a:buChar char="•"/>
-            </a:pPr>
             <a:r>
               <a:rPr lang="en-US" dirty="0" smtClean="0"/>
-              <a:t>Implemented a Windows native </a:t>
-            </a:r>
-            <a:r>
-              <a:rPr lang="en-US" dirty="0" err="1" smtClean="0"/>
-              <a:t>docker</a:t>
-            </a:r>
+              <a:t>Tons and tons of apps….</a:t>
+            </a:r>
+            <a:endParaRPr lang="en-US" dirty="0"/>
+          </a:p>
+        </p:txBody>
+      </p:sp>
+      <p:sp>
+        <p:nvSpPr>
+          <p:cNvPr id="5" name="TextBox 4"/>
+          <p:cNvSpPr txBox="1"/>
+          <p:nvPr/>
+        </p:nvSpPr>
+        <p:spPr>
+          <a:xfrm>
+            <a:off x="838200" y="2751018"/>
+            <a:ext cx="7239000" cy="369332"/>
+          </a:xfrm>
+          <a:prstGeom prst="rect">
+            <a:avLst/>
+          </a:prstGeom>
+          <a:noFill/>
+        </p:spPr>
+        <p:txBody>
+          <a:bodyPr wrap="square" rtlCol="0">
+            <a:spAutoFit/>
+          </a:bodyPr>
+          <a:lstStyle/>
+          <a:p>
             <a:r>
               <a:rPr lang="en-US" dirty="0" smtClean="0"/>
-              <a:t> client in .NET</a:t>
-            </a:r>
-          </a:p>
-          <a:p>
-            <a:pPr marL="285750" indent="-285750">
-              <a:buFont typeface="Arial" panose="020B0604020202020204" pitchFamily="34" charset="0"/>
-              <a:buChar char="•"/>
-            </a:pPr>
+              <a:t>Inside tons and tons of containers….</a:t>
+            </a:r>
+            <a:endParaRPr lang="en-US" dirty="0"/>
+          </a:p>
+        </p:txBody>
+      </p:sp>
+      <p:sp>
+        <p:nvSpPr>
+          <p:cNvPr id="6" name="TextBox 5"/>
+          <p:cNvSpPr txBox="1"/>
+          <p:nvPr/>
+        </p:nvSpPr>
+        <p:spPr>
+          <a:xfrm>
+            <a:off x="838200" y="3292236"/>
+            <a:ext cx="7239000" cy="369332"/>
+          </a:xfrm>
+          <a:prstGeom prst="rect">
+            <a:avLst/>
+          </a:prstGeom>
+          <a:noFill/>
+        </p:spPr>
+        <p:txBody>
+          <a:bodyPr wrap="square" rtlCol="0">
+            <a:spAutoFit/>
+          </a:bodyPr>
+          <a:lstStyle/>
+          <a:p>
             <a:r>
               <a:rPr lang="en-US" dirty="0" smtClean="0"/>
-              <a:t>Implementing a Docker image container service in Windows Server</a:t>
-            </a:r>
-          </a:p>
-          <a:p>
-            <a:pPr marL="285750" indent="-285750">
-              <a:buFont typeface="Arial" panose="020B0604020202020204" pitchFamily="34" charset="0"/>
-              <a:buChar char="•"/>
-            </a:pPr>
+              <a:t>Running on tons and tons of VMs….</a:t>
+            </a:r>
+            <a:endParaRPr lang="en-US" dirty="0"/>
+          </a:p>
+        </p:txBody>
+      </p:sp>
+      <p:sp>
+        <p:nvSpPr>
+          <p:cNvPr id="7" name="TextBox 6"/>
+          <p:cNvSpPr txBox="1"/>
+          <p:nvPr/>
+        </p:nvSpPr>
+        <p:spPr>
+          <a:xfrm>
+            <a:off x="838200" y="3833454"/>
+            <a:ext cx="7239000" cy="369332"/>
+          </a:xfrm>
+          <a:prstGeom prst="rect">
+            <a:avLst/>
+          </a:prstGeom>
+          <a:noFill/>
+        </p:spPr>
+        <p:txBody>
+          <a:bodyPr wrap="square" rtlCol="0">
+            <a:spAutoFit/>
+          </a:bodyPr>
+          <a:lstStyle/>
+          <a:p>
             <a:r>
               <a:rPr lang="en-US" dirty="0" smtClean="0"/>
-              <a:t>Implemented support for private, signed </a:t>
-            </a:r>
-            <a:r>
-              <a:rPr lang="en-US" dirty="0" err="1" smtClean="0"/>
-              <a:t>docker</a:t>
-            </a:r>
+              <a:t>Running on tons of operating systems….</a:t>
+            </a:r>
+            <a:endParaRPr lang="en-US" dirty="0"/>
+          </a:p>
+        </p:txBody>
+      </p:sp>
+      <p:sp>
+        <p:nvSpPr>
+          <p:cNvPr id="8" name="TextBox 7"/>
+          <p:cNvSpPr txBox="1"/>
+          <p:nvPr/>
+        </p:nvSpPr>
+        <p:spPr>
+          <a:xfrm>
+            <a:off x="838200" y="4374672"/>
+            <a:ext cx="7239000" cy="369332"/>
+          </a:xfrm>
+          <a:prstGeom prst="rect">
+            <a:avLst/>
+          </a:prstGeom>
+          <a:noFill/>
+        </p:spPr>
+        <p:txBody>
+          <a:bodyPr wrap="square" rtlCol="0">
+            <a:spAutoFit/>
+          </a:bodyPr>
+          <a:lstStyle/>
+          <a:p>
             <a:r>
               <a:rPr lang="en-US" dirty="0" smtClean="0"/>
-              <a:t> image registries in Azure Storage for private, verified, and controlled image repositories</a:t>
-            </a:r>
-          </a:p>
-          <a:p>
-            <a:pPr marL="285750" indent="-285750">
-              <a:buFont typeface="Arial" panose="020B0604020202020204" pitchFamily="34" charset="0"/>
-              <a:buChar char="•"/>
-            </a:pPr>
+              <a:t>Running on a bunch of physical computers….</a:t>
+            </a:r>
+            <a:endParaRPr lang="en-US" dirty="0"/>
+          </a:p>
+        </p:txBody>
+      </p:sp>
+      <p:sp>
+        <p:nvSpPr>
+          <p:cNvPr id="9" name="TextBox 8"/>
+          <p:cNvSpPr txBox="1"/>
+          <p:nvPr/>
+        </p:nvSpPr>
+        <p:spPr>
+          <a:xfrm>
+            <a:off x="6172200" y="5638800"/>
+            <a:ext cx="5638800" cy="369332"/>
+          </a:xfrm>
+          <a:prstGeom prst="rect">
+            <a:avLst/>
+          </a:prstGeom>
+          <a:noFill/>
+        </p:spPr>
+        <p:txBody>
+          <a:bodyPr wrap="square" rtlCol="0">
+            <a:spAutoFit/>
+          </a:bodyPr>
+          <a:lstStyle/>
+          <a:p>
             <a:r>
               <a:rPr lang="en-US" dirty="0" smtClean="0"/>
-              <a:t>Support for </a:t>
-            </a:r>
-            <a:r>
-              <a:rPr lang="en-US" dirty="0" err="1" smtClean="0"/>
-              <a:t>docker</a:t>
-            </a:r>
-            <a:r>
-              <a:rPr lang="en-US" dirty="0" smtClean="0"/>
-              <a:t> machine, </a:t>
-            </a:r>
-            <a:r>
-              <a:rPr lang="en-US" dirty="0" err="1" smtClean="0"/>
-              <a:t>docker</a:t>
-            </a:r>
-            <a:r>
-              <a:rPr lang="en-US" dirty="0" smtClean="0"/>
-              <a:t> swarm, and </a:t>
-            </a:r>
-            <a:r>
-              <a:rPr lang="en-US" dirty="0" err="1" smtClean="0"/>
-              <a:t>docker</a:t>
-            </a:r>
-            <a:r>
-              <a:rPr lang="en-US" dirty="0" smtClean="0"/>
-              <a:t> compose</a:t>
-            </a:r>
-          </a:p>
-          <a:p>
-            <a:pPr marL="285750" indent="-285750">
-              <a:buFont typeface="Arial" panose="020B0604020202020204" pitchFamily="34" charset="0"/>
-              <a:buChar char="•"/>
-            </a:pPr>
-            <a:r>
-              <a:rPr lang="en-US" dirty="0" smtClean="0"/>
-              <a:t>Support for specialized </a:t>
-            </a:r>
-            <a:r>
-              <a:rPr lang="en-US" dirty="0" err="1" smtClean="0"/>
-              <a:t>docker</a:t>
-            </a:r>
-            <a:r>
-              <a:rPr lang="en-US" dirty="0" smtClean="0"/>
-              <a:t> and </a:t>
-            </a:r>
-            <a:r>
-              <a:rPr lang="en-US" dirty="0" err="1" smtClean="0"/>
-              <a:t>linux</a:t>
-            </a:r>
-            <a:r>
-              <a:rPr lang="en-US" dirty="0" smtClean="0"/>
-              <a:t> container images:</a:t>
-            </a:r>
-          </a:p>
-          <a:p>
-            <a:pPr marL="742950" lvl="1" indent="-285750">
-              <a:buFont typeface="Arial" panose="020B0604020202020204" pitchFamily="34" charset="0"/>
-              <a:buChar char="•"/>
-            </a:pPr>
-            <a:r>
-              <a:rPr lang="en-US" dirty="0" smtClean="0"/>
-              <a:t>CoreOS</a:t>
-            </a:r>
-          </a:p>
-          <a:p>
-            <a:pPr marL="742950" lvl="1" indent="-285750">
-              <a:buFont typeface="Arial" panose="020B0604020202020204" pitchFamily="34" charset="0"/>
-              <a:buChar char="•"/>
-            </a:pPr>
-            <a:r>
-              <a:rPr lang="en-US" dirty="0" smtClean="0"/>
-              <a:t>Ubuntu Core and Snappy</a:t>
-            </a:r>
-          </a:p>
-          <a:p>
-            <a:pPr marL="742950" lvl="1" indent="-285750">
-              <a:buFont typeface="Arial" panose="020B0604020202020204" pitchFamily="34" charset="0"/>
-              <a:buChar char="•"/>
-            </a:pPr>
-            <a:r>
-              <a:rPr lang="en-US" dirty="0" smtClean="0"/>
-              <a:t>Fleet</a:t>
-            </a:r>
-          </a:p>
-          <a:p>
-            <a:pPr marL="742950" lvl="1" indent="-285750">
-              <a:buFont typeface="Arial" panose="020B0604020202020204" pitchFamily="34" charset="0"/>
-              <a:buChar char="•"/>
-            </a:pPr>
-            <a:r>
-              <a:rPr lang="en-US" dirty="0" err="1" smtClean="0"/>
-              <a:t>Deis</a:t>
-            </a:r>
-            <a:r>
-              <a:rPr lang="en-US" dirty="0" smtClean="0"/>
-              <a:t> </a:t>
-            </a:r>
-          </a:p>
-          <a:p>
-            <a:pPr marL="742950" lvl="1" indent="-285750">
-              <a:buFont typeface="Arial" panose="020B0604020202020204" pitchFamily="34" charset="0"/>
-              <a:buChar char="•"/>
-            </a:pPr>
-            <a:r>
-              <a:rPr lang="en-US" dirty="0" smtClean="0"/>
-              <a:t>Weave</a:t>
-            </a:r>
-          </a:p>
-          <a:p>
-            <a:pPr marL="742950" lvl="1" indent="-285750">
-              <a:buFont typeface="Arial" panose="020B0604020202020204" pitchFamily="34" charset="0"/>
-              <a:buChar char="•"/>
-            </a:pPr>
-            <a:r>
-              <a:rPr lang="en-US" dirty="0" smtClean="0"/>
-              <a:t>Kubernetes</a:t>
-            </a:r>
-          </a:p>
-          <a:p>
-            <a:pPr marL="742950" lvl="1" indent="-285750">
-              <a:buFont typeface="Arial" panose="020B0604020202020204" pitchFamily="34" charset="0"/>
-              <a:buChar char="•"/>
-            </a:pPr>
-            <a:r>
-              <a:rPr lang="en-US" dirty="0" err="1" smtClean="0"/>
-              <a:t>Mesos</a:t>
-            </a:r>
-            <a:r>
-              <a:rPr lang="en-US" dirty="0" smtClean="0"/>
-              <a:t> </a:t>
+              <a:t>You’re going to need a bigger boat.</a:t>
             </a:r>
             <a:endParaRPr lang="en-US" dirty="0"/>
           </a:p>
@@ -10456,7 +10484,7 @@
     </p:spTree>
     <p:extLst>
       <p:ext uri="{BB962C8B-B14F-4D97-AF65-F5344CB8AC3E}">
-        <p14:creationId xmlns:p14="http://schemas.microsoft.com/office/powerpoint/2010/main" val="3387061768"/>
+        <p14:creationId xmlns:p14="http://schemas.microsoft.com/office/powerpoint/2010/main" val="1591328291"/>
       </p:ext>
     </p:extLst>
   </p:cSld>
@@ -10470,550 +10498,6 @@
       </p:transition>
     </mc:Choice>
     <mc:Fallback xmlns="">
-      <p:transition spd="med">
-        <p:fade/>
-      </p:transition>
-    </mc:Fallback>
-  </mc:AlternateContent>
-  <p:timing>
-    <p:tnLst>
-      <p:par>
-        <p:cTn id="1" dur="indefinite" restart="never" nodeType="tmRoot"/>
-      </p:par>
-    </p:tnLst>
-  </p:timing>
-</p:sld>
-</file>
-
-<file path=ppt/slides/slide13.xml><?xml version="1.0" encoding="utf-8"?>
-<p:sld xmlns:a="http://schemas.openxmlformats.org/drawingml/2006/main" xmlns:r="http://schemas.openxmlformats.org/officeDocument/2006/relationships" xmlns:p="http://schemas.openxmlformats.org/presentationml/2006/main">
-  <p:cSld>
-    <p:spTree>
-      <p:nvGrpSpPr>
-        <p:cNvPr id="1" name=""/>
-        <p:cNvGrpSpPr/>
-        <p:nvPr/>
-      </p:nvGrpSpPr>
-      <p:grpSpPr>
-        <a:xfrm>
-          <a:off x="0" y="0"/>
-          <a:ext cx="0" cy="0"/>
-          <a:chOff x="0" y="0"/>
-          <a:chExt cx="0" cy="0"/>
-        </a:xfrm>
-      </p:grpSpPr>
-      <p:sp>
-        <p:nvSpPr>
-          <p:cNvPr id="2" name="Title 1"/>
-          <p:cNvSpPr>
-            <a:spLocks noGrp="1"/>
-          </p:cNvSpPr>
-          <p:nvPr>
-            <p:ph type="title"/>
-          </p:nvPr>
-        </p:nvSpPr>
-        <p:spPr/>
-        <p:txBody>
-          <a:bodyPr/>
-          <a:lstStyle/>
-          <a:p>
-            <a:r>
-              <a:rPr lang="en-US" dirty="0" smtClean="0"/>
-              <a:t>Who’s the top contributor to Docker? </a:t>
-            </a:r>
-            <a:r>
-              <a:rPr lang="en-US" dirty="0" smtClean="0">
-                <a:sym typeface="Wingdings" panose="05000000000000000000" pitchFamily="2" charset="2"/>
-              </a:rPr>
-              <a:t></a:t>
-            </a:r>
-            <a:endParaRPr lang="en-US" dirty="0"/>
-          </a:p>
-        </p:txBody>
-      </p:sp>
-      <p:pic>
-        <p:nvPicPr>
-          <p:cNvPr id="3" name="Picture 2"/>
-          <p:cNvPicPr>
-            <a:picLocks noChangeAspect="1"/>
-          </p:cNvPicPr>
-          <p:nvPr/>
-        </p:nvPicPr>
-        <p:blipFill>
-          <a:blip r:embed="rId2"/>
-          <a:stretch>
-            <a:fillRect/>
-          </a:stretch>
-        </p:blipFill>
-        <p:spPr>
-          <a:xfrm>
-            <a:off x="1981200" y="1676400"/>
-            <a:ext cx="7672237" cy="4959003"/>
-          </a:xfrm>
-          <a:prstGeom prst="rect">
-            <a:avLst/>
-          </a:prstGeom>
-        </p:spPr>
-      </p:pic>
-    </p:spTree>
-    <p:extLst>
-      <p:ext uri="{BB962C8B-B14F-4D97-AF65-F5344CB8AC3E}">
-        <p14:creationId xmlns:p14="http://schemas.microsoft.com/office/powerpoint/2010/main" val="3440500440"/>
-      </p:ext>
-    </p:extLst>
-  </p:cSld>
-  <p:clrMapOvr>
-    <a:masterClrMapping/>
-  </p:clrMapOvr>
-  <mc:AlternateContent xmlns:mc="http://schemas.openxmlformats.org/markup-compatibility/2006" xmlns:p14="http://schemas.microsoft.com/office/powerpoint/2010/main">
-    <mc:Choice Requires="p14">
-      <p:transition spd="med" p14:dur="700">
-        <p:fade/>
-      </p:transition>
-    </mc:Choice>
-    <mc:Fallback xmlns="">
-      <p:transition spd="med">
-        <p:fade/>
-      </p:transition>
-    </mc:Fallback>
-  </mc:AlternateContent>
-  <p:timing>
-    <p:tnLst>
-      <p:par>
-        <p:cTn id="1" dur="indefinite" restart="never" nodeType="tmRoot">
-          <p:childTnLst>
-            <p:seq concurrent="1" nextAc="seek">
-              <p:cTn id="2" dur="indefinite" nodeType="mainSeq">
-                <p:childTnLst>
-                  <p:par>
-                    <p:cTn id="3" fill="hold">
-                      <p:stCondLst>
-                        <p:cond delay="indefinite"/>
-                      </p:stCondLst>
-                      <p:childTnLst>
-                        <p:par>
-                          <p:cTn id="4" fill="hold">
-                            <p:stCondLst>
-                              <p:cond delay="0"/>
-                            </p:stCondLst>
-                            <p:childTnLst>
-                              <p:par>
-                                <p:cTn id="5" presetID="10" presetClass="entr" presetSubtype="0" fill="hold" nodeType="clickEffect">
-                                  <p:stCondLst>
-                                    <p:cond delay="0"/>
-                                  </p:stCondLst>
-                                  <p:childTnLst>
-                                    <p:set>
-                                      <p:cBhvr>
-                                        <p:cTn id="6" dur="1" fill="hold">
-                                          <p:stCondLst>
-                                            <p:cond delay="0"/>
-                                          </p:stCondLst>
-                                        </p:cTn>
-                                        <p:tgtEl>
-                                          <p:spTgt spid="3"/>
-                                        </p:tgtEl>
-                                        <p:attrNameLst>
-                                          <p:attrName>style.visibility</p:attrName>
-                                        </p:attrNameLst>
-                                      </p:cBhvr>
-                                      <p:to>
-                                        <p:strVal val="visible"/>
-                                      </p:to>
-                                    </p:set>
-                                    <p:animEffect transition="in" filter="fade">
-                                      <p:cBhvr>
-                                        <p:cTn id="7" dur="500"/>
-                                        <p:tgtEl>
-                                          <p:spTgt spid="3"/>
-                                        </p:tgtEl>
-                                      </p:cBhvr>
-                                    </p:animEffect>
-                                  </p:childTnLst>
-                                </p:cTn>
-                              </p:par>
-                            </p:childTnLst>
-                          </p:cTn>
-                        </p:par>
-                      </p:childTnLst>
-                    </p:cTn>
-                  </p:par>
-                </p:childTnLst>
-              </p:cTn>
-              <p:prevCondLst>
-                <p:cond evt="onPrev" delay="0">
-                  <p:tgtEl>
-                    <p:sldTgt/>
-                  </p:tgtEl>
-                </p:cond>
-              </p:prevCondLst>
-              <p:nextCondLst>
-                <p:cond evt="onNext" delay="0">
-                  <p:tgtEl>
-                    <p:sldTgt/>
-                  </p:tgtEl>
-                </p:cond>
-              </p:nextCondLst>
-            </p:seq>
-          </p:childTnLst>
-        </p:cTn>
-      </p:par>
-    </p:tnLst>
-  </p:timing>
-</p:sld>
-</file>
-
-<file path=ppt/slides/slide14.xml><?xml version="1.0" encoding="utf-8"?>
-<p:sld xmlns:a="http://schemas.openxmlformats.org/drawingml/2006/main" xmlns:r="http://schemas.openxmlformats.org/officeDocument/2006/relationships" xmlns:p="http://schemas.openxmlformats.org/presentationml/2006/main">
-  <p:cSld>
-    <p:spTree>
-      <p:nvGrpSpPr>
-        <p:cNvPr id="1" name=""/>
-        <p:cNvGrpSpPr/>
-        <p:nvPr/>
-      </p:nvGrpSpPr>
-      <p:grpSpPr>
-        <a:xfrm>
-          <a:off x="0" y="0"/>
-          <a:ext cx="0" cy="0"/>
-          <a:chOff x="0" y="0"/>
-          <a:chExt cx="0" cy="0"/>
-        </a:xfrm>
-      </p:grpSpPr>
-      <p:sp>
-        <p:nvSpPr>
-          <p:cNvPr id="2" name="Title 1"/>
-          <p:cNvSpPr>
-            <a:spLocks noGrp="1"/>
-          </p:cNvSpPr>
-          <p:nvPr>
-            <p:ph type="title"/>
-          </p:nvPr>
-        </p:nvSpPr>
-        <p:spPr/>
-        <p:txBody>
-          <a:bodyPr/>
-          <a:lstStyle/>
-          <a:p>
-            <a:r>
-              <a:rPr lang="en-US" dirty="0" smtClean="0"/>
-              <a:t>What it DOES mean: </a:t>
-            </a:r>
-            <a:r>
-              <a:rPr lang="en-US" dirty="0" err="1" smtClean="0"/>
-              <a:t>Microservices</a:t>
-            </a:r>
-            <a:r>
-              <a:rPr lang="en-US" dirty="0" smtClean="0"/>
-              <a:t> architectures…</a:t>
-            </a:r>
-            <a:endParaRPr lang="en-US" dirty="0"/>
-          </a:p>
-        </p:txBody>
-      </p:sp>
-      <p:sp>
-        <p:nvSpPr>
-          <p:cNvPr id="3" name="TextBox 2"/>
-          <p:cNvSpPr txBox="1"/>
-          <p:nvPr/>
-        </p:nvSpPr>
-        <p:spPr>
-          <a:xfrm>
-            <a:off x="762000" y="2286000"/>
-            <a:ext cx="10591800" cy="3657600"/>
-          </a:xfrm>
-          <a:prstGeom prst="rect">
-            <a:avLst/>
-          </a:prstGeom>
-          <a:noFill/>
-        </p:spPr>
-        <p:txBody>
-          <a:bodyPr wrap="square" rtlCol="0">
-            <a:spAutoFit/>
-          </a:bodyPr>
-          <a:lstStyle/>
-          <a:p>
-            <a:endParaRPr lang="en-US" dirty="0"/>
-          </a:p>
-        </p:txBody>
-      </p:sp>
-    </p:spTree>
-    <p:extLst>
-      <p:ext uri="{BB962C8B-B14F-4D97-AF65-F5344CB8AC3E}">
-        <p14:creationId xmlns:p14="http://schemas.microsoft.com/office/powerpoint/2010/main" val="160338960"/>
-      </p:ext>
-    </p:extLst>
-  </p:cSld>
-  <p:clrMapOvr>
-    <a:masterClrMapping/>
-  </p:clrMapOvr>
-  <mc:AlternateContent xmlns:mc="http://schemas.openxmlformats.org/markup-compatibility/2006" xmlns:p14="http://schemas.microsoft.com/office/powerpoint/2010/main">
-    <mc:Choice Requires="p14">
-      <p:transition spd="med" p14:dur="700">
-        <p:fade/>
-      </p:transition>
-    </mc:Choice>
-    <mc:Fallback xmlns="">
-      <p:transition spd="med">
-        <p:fade/>
-      </p:transition>
-    </mc:Fallback>
-  </mc:AlternateContent>
-  <p:timing>
-    <p:tnLst>
-      <p:par>
-        <p:cTn id="1" dur="indefinite" restart="never" nodeType="tmRoot"/>
-      </p:par>
-    </p:tnLst>
-  </p:timing>
-</p:sld>
-</file>
-
-<file path=ppt/slides/slide15.xml><?xml version="1.0" encoding="utf-8"?>
-<p:sld xmlns:a="http://schemas.openxmlformats.org/drawingml/2006/main" xmlns:r="http://schemas.openxmlformats.org/officeDocument/2006/relationships" xmlns:p="http://schemas.openxmlformats.org/presentationml/2006/main">
-  <p:cSld>
-    <p:spTree>
-      <p:nvGrpSpPr>
-        <p:cNvPr id="1" name=""/>
-        <p:cNvGrpSpPr/>
-        <p:nvPr/>
-      </p:nvGrpSpPr>
-      <p:grpSpPr>
-        <a:xfrm>
-          <a:off x="0" y="0"/>
-          <a:ext cx="0" cy="0"/>
-          <a:chOff x="0" y="0"/>
-          <a:chExt cx="0" cy="0"/>
-        </a:xfrm>
-      </p:grpSpPr>
-      <p:sp>
-        <p:nvSpPr>
-          <p:cNvPr id="2" name="Title 1"/>
-          <p:cNvSpPr>
-            <a:spLocks noGrp="1"/>
-          </p:cNvSpPr>
-          <p:nvPr>
-            <p:ph type="title"/>
-          </p:nvPr>
-        </p:nvSpPr>
-        <p:spPr/>
-        <p:txBody>
-          <a:bodyPr/>
-          <a:lstStyle/>
-          <a:p>
-            <a:r>
-              <a:rPr lang="en-US" dirty="0" smtClean="0"/>
-              <a:t>What do </a:t>
-            </a:r>
-            <a:r>
-              <a:rPr lang="en-US" dirty="0" err="1" smtClean="0"/>
-              <a:t>Microservices</a:t>
-            </a:r>
-            <a:r>
-              <a:rPr lang="en-US" dirty="0" smtClean="0"/>
-              <a:t> mean? </a:t>
-            </a:r>
-            <a:endParaRPr lang="en-US" dirty="0"/>
-          </a:p>
-        </p:txBody>
-      </p:sp>
-      <p:sp>
-        <p:nvSpPr>
-          <p:cNvPr id="3" name="TextBox 2"/>
-          <p:cNvSpPr txBox="1"/>
-          <p:nvPr/>
-        </p:nvSpPr>
-        <p:spPr>
-          <a:xfrm>
-            <a:off x="838200" y="2209800"/>
-            <a:ext cx="7239000" cy="369332"/>
-          </a:xfrm>
-          <a:prstGeom prst="rect">
-            <a:avLst/>
-          </a:prstGeom>
-          <a:noFill/>
-        </p:spPr>
-        <p:txBody>
-          <a:bodyPr wrap="square" rtlCol="0">
-            <a:spAutoFit/>
-          </a:bodyPr>
-          <a:lstStyle/>
-          <a:p>
-            <a:r>
-              <a:rPr lang="en-US" dirty="0" smtClean="0"/>
-              <a:t>Tons and tons of apps….</a:t>
-            </a:r>
-            <a:endParaRPr lang="en-US" dirty="0"/>
-          </a:p>
-        </p:txBody>
-      </p:sp>
-      <p:sp>
-        <p:nvSpPr>
-          <p:cNvPr id="5" name="TextBox 4"/>
-          <p:cNvSpPr txBox="1"/>
-          <p:nvPr/>
-        </p:nvSpPr>
-        <p:spPr>
-          <a:xfrm>
-            <a:off x="838200" y="2751018"/>
-            <a:ext cx="7239000" cy="369332"/>
-          </a:xfrm>
-          <a:prstGeom prst="rect">
-            <a:avLst/>
-          </a:prstGeom>
-          <a:noFill/>
-        </p:spPr>
-        <p:txBody>
-          <a:bodyPr wrap="square" rtlCol="0">
-            <a:spAutoFit/>
-          </a:bodyPr>
-          <a:lstStyle/>
-          <a:p>
-            <a:r>
-              <a:rPr lang="en-US" dirty="0" smtClean="0"/>
-              <a:t>Inside tons and tons of containers….</a:t>
-            </a:r>
-            <a:endParaRPr lang="en-US" dirty="0"/>
-          </a:p>
-        </p:txBody>
-      </p:sp>
-      <p:sp>
-        <p:nvSpPr>
-          <p:cNvPr id="6" name="TextBox 5"/>
-          <p:cNvSpPr txBox="1"/>
-          <p:nvPr/>
-        </p:nvSpPr>
-        <p:spPr>
-          <a:xfrm>
-            <a:off x="838200" y="3292236"/>
-            <a:ext cx="7239000" cy="369332"/>
-          </a:xfrm>
-          <a:prstGeom prst="rect">
-            <a:avLst/>
-          </a:prstGeom>
-          <a:noFill/>
-        </p:spPr>
-        <p:txBody>
-          <a:bodyPr wrap="square" rtlCol="0">
-            <a:spAutoFit/>
-          </a:bodyPr>
-          <a:lstStyle/>
-          <a:p>
-            <a:r>
-              <a:rPr lang="en-US" dirty="0" smtClean="0"/>
-              <a:t>Running on tons and tons of VMs….</a:t>
-            </a:r>
-            <a:endParaRPr lang="en-US" dirty="0"/>
-          </a:p>
-        </p:txBody>
-      </p:sp>
-      <p:sp>
-        <p:nvSpPr>
-          <p:cNvPr id="7" name="TextBox 6"/>
-          <p:cNvSpPr txBox="1"/>
-          <p:nvPr/>
-        </p:nvSpPr>
-        <p:spPr>
-          <a:xfrm>
-            <a:off x="838200" y="3833454"/>
-            <a:ext cx="7239000" cy="369332"/>
-          </a:xfrm>
-          <a:prstGeom prst="rect">
-            <a:avLst/>
-          </a:prstGeom>
-          <a:noFill/>
-        </p:spPr>
-        <p:txBody>
-          <a:bodyPr wrap="square" rtlCol="0">
-            <a:spAutoFit/>
-          </a:bodyPr>
-          <a:lstStyle/>
-          <a:p>
-            <a:r>
-              <a:rPr lang="en-US" dirty="0" smtClean="0"/>
-              <a:t>Running on tons of operating systems….</a:t>
-            </a:r>
-            <a:endParaRPr lang="en-US" dirty="0"/>
-          </a:p>
-        </p:txBody>
-      </p:sp>
-      <p:sp>
-        <p:nvSpPr>
-          <p:cNvPr id="8" name="TextBox 7"/>
-          <p:cNvSpPr txBox="1"/>
-          <p:nvPr/>
-        </p:nvSpPr>
-        <p:spPr>
-          <a:xfrm>
-            <a:off x="838200" y="4374672"/>
-            <a:ext cx="7239000" cy="369332"/>
-          </a:xfrm>
-          <a:prstGeom prst="rect">
-            <a:avLst/>
-          </a:prstGeom>
-          <a:noFill/>
-        </p:spPr>
-        <p:txBody>
-          <a:bodyPr wrap="square" rtlCol="0">
-            <a:spAutoFit/>
-          </a:bodyPr>
-          <a:lstStyle/>
-          <a:p>
-            <a:r>
-              <a:rPr lang="en-US" dirty="0" smtClean="0"/>
-              <a:t>Running on a bunch of physical computers….</a:t>
-            </a:r>
-            <a:endParaRPr lang="en-US" dirty="0"/>
-          </a:p>
-        </p:txBody>
-      </p:sp>
-      <p:sp>
-        <p:nvSpPr>
-          <p:cNvPr id="9" name="TextBox 8"/>
-          <p:cNvSpPr txBox="1"/>
-          <p:nvPr/>
-        </p:nvSpPr>
-        <p:spPr>
-          <a:xfrm>
-            <a:off x="6172200" y="5638800"/>
-            <a:ext cx="5638800" cy="369332"/>
-          </a:xfrm>
-          <a:prstGeom prst="rect">
-            <a:avLst/>
-          </a:prstGeom>
-          <a:noFill/>
-        </p:spPr>
-        <p:txBody>
-          <a:bodyPr wrap="square" rtlCol="0">
-            <a:spAutoFit/>
-          </a:bodyPr>
-          <a:lstStyle/>
-          <a:p>
-            <a:r>
-              <a:rPr lang="en-US" dirty="0" smtClean="0"/>
-              <a:t>You’re going to need a bigger boat.</a:t>
-            </a:r>
-            <a:endParaRPr lang="en-US" dirty="0"/>
-          </a:p>
-        </p:txBody>
-      </p:sp>
-    </p:spTree>
-    <p:extLst>
-      <p:ext uri="{BB962C8B-B14F-4D97-AF65-F5344CB8AC3E}">
-        <p14:creationId xmlns:p14="http://schemas.microsoft.com/office/powerpoint/2010/main" val="1591328291"/>
-      </p:ext>
-    </p:extLst>
-  </p:cSld>
-  <p:clrMapOvr>
-    <a:masterClrMapping/>
-  </p:clrMapOvr>
-  <mc:AlternateContent xmlns:mc="http://schemas.openxmlformats.org/markup-compatibility/2006">
-    <mc:Choice xmlns:p14="http://schemas.microsoft.com/office/powerpoint/2010/main" Requires="p14">
-      <p:transition spd="med" p14:dur="700">
-        <p:fade/>
-      </p:transition>
-    </mc:Choice>
-    <mc:Fallback>
       <p:transition spd="med">
         <p:fade/>
       </p:transition>
@@ -11324,7 +10808,7 @@
 </p:sld>
 </file>
 
-<file path=ppt/slides/slide16.xml><?xml version="1.0" encoding="utf-8"?>
+<file path=ppt/slides/slide13.xml><?xml version="1.0" encoding="utf-8"?>
 <p:sld xmlns:a="http://schemas.openxmlformats.org/drawingml/2006/main" xmlns:r="http://schemas.openxmlformats.org/officeDocument/2006/relationships" xmlns:p="http://schemas.openxmlformats.org/presentationml/2006/main">
   <p:cSld>
     <p:spTree>
@@ -11368,7 +10852,7 @@
     <p:controls>
       <mc:AlternateContent xmlns:mc="http://schemas.openxmlformats.org/markup-compatibility/2006">
         <mc:Choice xmlns:v="urn:schemas-microsoft-com:vml" Requires="v">
-          <p:control spid="1028" name="ShockwaveFlash1" r:id="rId2" imgW="8229600" imgH="4572000"/>
+          <p:control spid="1032" name="ShockwaveFlash1" r:id="rId2" imgW="8229600" imgH="4572000"/>
         </mc:Choice>
         <mc:Fallback>
           <p:control name="ShockwaveFlash1" r:id="rId2" imgW="8229600" imgH="4572000">
@@ -11409,13 +10893,13 @@
   <p:clrMapOvr>
     <a:masterClrMapping/>
   </p:clrMapOvr>
-  <mc:AlternateContent xmlns:mc="http://schemas.openxmlformats.org/markup-compatibility/2006">
-    <mc:Choice xmlns:p14="http://schemas.microsoft.com/office/powerpoint/2010/main" Requires="p14">
+  <mc:AlternateContent xmlns:mc="http://schemas.openxmlformats.org/markup-compatibility/2006" xmlns:p14="http://schemas.microsoft.com/office/powerpoint/2010/main">
+    <mc:Choice Requires="p14">
       <p:transition spd="med" p14:dur="700">
         <p:fade/>
       </p:transition>
     </mc:Choice>
-    <mc:Fallback>
+    <mc:Fallback xmlns="">
       <p:transition spd="med">
         <p:fade/>
       </p:transition>
@@ -11431,7 +10915,7 @@
 </p:sld>
 </file>
 
-<file path=ppt/slides/slide17.xml><?xml version="1.0" encoding="utf-8"?>
+<file path=ppt/slides/slide14.xml><?xml version="1.0" encoding="utf-8"?>
 <p:sld xmlns:a="http://schemas.openxmlformats.org/drawingml/2006/main" xmlns:r="http://schemas.openxmlformats.org/officeDocument/2006/relationships" xmlns:p="http://schemas.openxmlformats.org/presentationml/2006/main">
   <p:cSld>
     <p:spTree>
@@ -11516,13 +11000,13 @@
   <p:clrMapOvr>
     <a:masterClrMapping/>
   </p:clrMapOvr>
-  <mc:AlternateContent xmlns:mc="http://schemas.openxmlformats.org/markup-compatibility/2006">
-    <mc:Choice xmlns:p14="http://schemas.microsoft.com/office/powerpoint/2010/main" Requires="p14">
+  <mc:AlternateContent xmlns:mc="http://schemas.openxmlformats.org/markup-compatibility/2006" xmlns:p14="http://schemas.microsoft.com/office/powerpoint/2010/main">
+    <mc:Choice Requires="p14">
       <p:transition spd="med" p14:dur="700">
         <p:fade/>
       </p:transition>
     </mc:Choice>
-    <mc:Fallback>
+    <mc:Fallback xmlns="">
       <p:transition spd="med">
         <p:fade/>
       </p:transition>
@@ -11617,7 +11101,7 @@
 </p:sld>
 </file>
 
-<file path=ppt/slides/slide18.xml><?xml version="1.0" encoding="utf-8"?>
+<file path=ppt/slides/slide15.xml><?xml version="1.0" encoding="utf-8"?>
 <p:sld xmlns:a="http://schemas.openxmlformats.org/drawingml/2006/main" xmlns:r="http://schemas.openxmlformats.org/officeDocument/2006/relationships" xmlns:p="http://schemas.openxmlformats.org/presentationml/2006/main">
   <p:cSld>
     <p:spTree>
@@ -11804,13 +11288,13 @@
   <p:clrMapOvr>
     <a:masterClrMapping/>
   </p:clrMapOvr>
-  <mc:AlternateContent xmlns:mc="http://schemas.openxmlformats.org/markup-compatibility/2006">
-    <mc:Choice xmlns:p14="http://schemas.microsoft.com/office/powerpoint/2010/main" Requires="p14">
+  <mc:AlternateContent xmlns:mc="http://schemas.openxmlformats.org/markup-compatibility/2006" xmlns:p14="http://schemas.microsoft.com/office/powerpoint/2010/main">
+    <mc:Choice Requires="p14">
       <p:transition spd="med" p14:dur="700">
         <p:fade/>
       </p:transition>
     </mc:Choice>
-    <mc:Fallback>
+    <mc:Fallback xmlns="">
       <p:transition spd="med">
         <p:fade/>
       </p:transition>
@@ -12013,6 +11497,629 @@
 </p:sld>
 </file>
 
+<file path=ppt/slides/slide16.xml><?xml version="1.0" encoding="utf-8"?>
+<p:sld xmlns:a="http://schemas.openxmlformats.org/drawingml/2006/main" xmlns:r="http://schemas.openxmlformats.org/officeDocument/2006/relationships" xmlns:p="http://schemas.openxmlformats.org/presentationml/2006/main">
+  <p:cSld>
+    <p:spTree>
+      <p:nvGrpSpPr>
+        <p:cNvPr id="1" name=""/>
+        <p:cNvGrpSpPr/>
+        <p:nvPr/>
+      </p:nvGrpSpPr>
+      <p:grpSpPr>
+        <a:xfrm>
+          <a:off x="0" y="0"/>
+          <a:ext cx="0" cy="0"/>
+          <a:chOff x="0" y="0"/>
+          <a:chExt cx="0" cy="0"/>
+        </a:xfrm>
+      </p:grpSpPr>
+      <p:sp>
+        <p:nvSpPr>
+          <p:cNvPr id="2" name="Title 1"/>
+          <p:cNvSpPr>
+            <a:spLocks noGrp="1"/>
+          </p:cNvSpPr>
+          <p:nvPr>
+            <p:ph type="title"/>
+          </p:nvPr>
+        </p:nvSpPr>
+        <p:spPr>
+          <a:xfrm>
+            <a:off x="646111" y="452718"/>
+            <a:ext cx="9869489" cy="1400530"/>
+          </a:xfrm>
+        </p:spPr>
+        <p:txBody>
+          <a:bodyPr/>
+          <a:lstStyle/>
+          <a:p>
+            <a:r>
+              <a:rPr lang="en-US" dirty="0" smtClean="0"/>
+              <a:t>You’re going to need orchestration.</a:t>
+            </a:r>
+            <a:endParaRPr lang="en-US" dirty="0"/>
+          </a:p>
+        </p:txBody>
+      </p:sp>
+      <p:sp>
+        <p:nvSpPr>
+          <p:cNvPr id="3" name="TextBox 2"/>
+          <p:cNvSpPr txBox="1"/>
+          <p:nvPr/>
+        </p:nvSpPr>
+        <p:spPr>
+          <a:xfrm>
+            <a:off x="838200" y="1600200"/>
+            <a:ext cx="5715000" cy="369332"/>
+          </a:xfrm>
+          <a:prstGeom prst="rect">
+            <a:avLst/>
+          </a:prstGeom>
+          <a:noFill/>
+        </p:spPr>
+        <p:txBody>
+          <a:bodyPr wrap="square" rtlCol="0">
+            <a:spAutoFit/>
+          </a:bodyPr>
+          <a:lstStyle/>
+          <a:p>
+            <a:r>
+              <a:rPr lang="en-US" dirty="0" smtClean="0"/>
+              <a:t>Orchestration</a:t>
+            </a:r>
+            <a:r>
+              <a:rPr lang="en-US" dirty="0"/>
+              <a:t> </a:t>
+            </a:r>
+            <a:r>
+              <a:rPr lang="en-US" dirty="0" smtClean="0"/>
+              <a:t>examples</a:t>
+            </a:r>
+            <a:endParaRPr lang="en-US" dirty="0"/>
+          </a:p>
+        </p:txBody>
+      </p:sp>
+      <p:sp>
+        <p:nvSpPr>
+          <p:cNvPr id="4" name="TextBox 3"/>
+          <p:cNvSpPr txBox="1"/>
+          <p:nvPr/>
+        </p:nvSpPr>
+        <p:spPr>
+          <a:xfrm>
+            <a:off x="2438400" y="2667000"/>
+            <a:ext cx="6705600" cy="3416320"/>
+          </a:xfrm>
+          <a:prstGeom prst="rect">
+            <a:avLst/>
+          </a:prstGeom>
+          <a:noFill/>
+        </p:spPr>
+        <p:txBody>
+          <a:bodyPr wrap="square" rtlCol="0">
+            <a:spAutoFit/>
+          </a:bodyPr>
+          <a:lstStyle/>
+          <a:p>
+            <a:pPr marL="285750" indent="-285750">
+              <a:buFont typeface="Arial" panose="020B0604020202020204" pitchFamily="34" charset="0"/>
+              <a:buChar char="•"/>
+            </a:pPr>
+            <a:r>
+              <a:rPr lang="en-US" dirty="0" smtClean="0"/>
+              <a:t>Chef and Puppet – configuration support</a:t>
+            </a:r>
+          </a:p>
+          <a:p>
+            <a:pPr marL="285750" indent="-285750">
+              <a:buFont typeface="Arial" panose="020B0604020202020204" pitchFamily="34" charset="0"/>
+              <a:buChar char="•"/>
+            </a:pPr>
+            <a:r>
+              <a:rPr lang="en-US" dirty="0" smtClean="0"/>
+              <a:t>Docker, </a:t>
+            </a:r>
+            <a:r>
+              <a:rPr lang="en-US" dirty="0" err="1" smtClean="0"/>
+              <a:t>docker</a:t>
+            </a:r>
+            <a:r>
+              <a:rPr lang="en-US" dirty="0" smtClean="0"/>
+              <a:t>-machine, </a:t>
+            </a:r>
+            <a:r>
+              <a:rPr lang="en-US" dirty="0" err="1" smtClean="0"/>
+              <a:t>docker</a:t>
+            </a:r>
+            <a:r>
+              <a:rPr lang="en-US" dirty="0" smtClean="0"/>
+              <a:t>-swarm, and </a:t>
+            </a:r>
+            <a:r>
+              <a:rPr lang="en-US" dirty="0" err="1" smtClean="0"/>
+              <a:t>docker</a:t>
+            </a:r>
+            <a:r>
+              <a:rPr lang="en-US" dirty="0" smtClean="0"/>
+              <a:t>-compose – container, </a:t>
+            </a:r>
+            <a:r>
+              <a:rPr lang="en-US" dirty="0" err="1" smtClean="0"/>
+              <a:t>vm</a:t>
+            </a:r>
+            <a:r>
+              <a:rPr lang="en-US" dirty="0" smtClean="0"/>
+              <a:t>, container-clustering, and app configuration</a:t>
+            </a:r>
+          </a:p>
+          <a:p>
+            <a:pPr marL="285750" indent="-285750">
+              <a:buFont typeface="Arial" panose="020B0604020202020204" pitchFamily="34" charset="0"/>
+              <a:buChar char="•"/>
+            </a:pPr>
+            <a:r>
+              <a:rPr lang="en-US" dirty="0" err="1" smtClean="0"/>
+              <a:t>Deis</a:t>
+            </a:r>
+            <a:r>
+              <a:rPr lang="en-US" dirty="0" smtClean="0"/>
+              <a:t> – complete deployment and </a:t>
+            </a:r>
+            <a:r>
+              <a:rPr lang="en-US" dirty="0" err="1" smtClean="0"/>
+              <a:t>Heroku</a:t>
+            </a:r>
+            <a:r>
+              <a:rPr lang="en-US" dirty="0" smtClean="0"/>
+              <a:t> pack compatibility</a:t>
+            </a:r>
+          </a:p>
+          <a:p>
+            <a:pPr marL="285750" indent="-285750">
+              <a:buFont typeface="Arial" panose="020B0604020202020204" pitchFamily="34" charset="0"/>
+              <a:buChar char="•"/>
+            </a:pPr>
+            <a:r>
+              <a:rPr lang="en-US" dirty="0" smtClean="0"/>
+              <a:t>Flynn</a:t>
+            </a:r>
+          </a:p>
+          <a:p>
+            <a:pPr marL="285750" indent="-285750">
+              <a:buFont typeface="Arial" panose="020B0604020202020204" pitchFamily="34" charset="0"/>
+              <a:buChar char="•"/>
+            </a:pPr>
+            <a:r>
+              <a:rPr lang="en-US" dirty="0" smtClean="0"/>
+              <a:t>Kubernetes – Google’s public orchestration system </a:t>
+            </a:r>
+          </a:p>
+          <a:p>
+            <a:pPr marL="285750" indent="-285750">
+              <a:buFont typeface="Arial" panose="020B0604020202020204" pitchFamily="34" charset="0"/>
+              <a:buChar char="•"/>
+            </a:pPr>
+            <a:r>
+              <a:rPr lang="en-US" dirty="0" smtClean="0"/>
+              <a:t>Apache </a:t>
+            </a:r>
+            <a:r>
+              <a:rPr lang="en-US" dirty="0" err="1" smtClean="0"/>
+              <a:t>Mesos</a:t>
+            </a:r>
+            <a:r>
+              <a:rPr lang="en-US" dirty="0" smtClean="0"/>
+              <a:t> – a public version of Twitter’s orchestration system</a:t>
+            </a:r>
+          </a:p>
+          <a:p>
+            <a:pPr marL="285750" indent="-285750">
+              <a:buFont typeface="Arial" panose="020B0604020202020204" pitchFamily="34" charset="0"/>
+              <a:buChar char="•"/>
+            </a:pPr>
+            <a:r>
+              <a:rPr lang="en-US" dirty="0" smtClean="0"/>
+              <a:t>Ubuntu’s juju, </a:t>
+            </a:r>
+            <a:r>
+              <a:rPr lang="en-US" dirty="0" err="1" smtClean="0"/>
+              <a:t>RedHat’s</a:t>
+            </a:r>
+            <a:r>
+              <a:rPr lang="en-US" dirty="0" smtClean="0"/>
+              <a:t> Project Atomic, Microsoft’s resource group templates…. </a:t>
+            </a:r>
+            <a:endParaRPr lang="en-US" dirty="0"/>
+          </a:p>
+        </p:txBody>
+      </p:sp>
+    </p:spTree>
+    <p:extLst>
+      <p:ext uri="{BB962C8B-B14F-4D97-AF65-F5344CB8AC3E}">
+        <p14:creationId xmlns:p14="http://schemas.microsoft.com/office/powerpoint/2010/main" val="213513301"/>
+      </p:ext>
+    </p:extLst>
+  </p:cSld>
+  <p:clrMapOvr>
+    <a:masterClrMapping/>
+  </p:clrMapOvr>
+  <mc:AlternateContent xmlns:mc="http://schemas.openxmlformats.org/markup-compatibility/2006">
+    <mc:Choice xmlns:p14="http://schemas.microsoft.com/office/powerpoint/2010/main" Requires="p14">
+      <p:transition spd="med" p14:dur="700">
+        <p:fade/>
+      </p:transition>
+    </mc:Choice>
+    <mc:Fallback>
+      <p:transition spd="med">
+        <p:fade/>
+      </p:transition>
+    </mc:Fallback>
+  </mc:AlternateContent>
+  <p:timing>
+    <p:tnLst>
+      <p:par>
+        <p:cTn id="1" dur="indefinite" restart="never" nodeType="tmRoot">
+          <p:childTnLst>
+            <p:seq concurrent="1" nextAc="seek">
+              <p:cTn id="2" dur="indefinite" nodeType="mainSeq">
+                <p:childTnLst>
+                  <p:par>
+                    <p:cTn id="3" fill="hold">
+                      <p:stCondLst>
+                        <p:cond delay="indefinite"/>
+                      </p:stCondLst>
+                      <p:childTnLst>
+                        <p:par>
+                          <p:cTn id="4" fill="hold">
+                            <p:stCondLst>
+                              <p:cond delay="0"/>
+                            </p:stCondLst>
+                            <p:childTnLst>
+                              <p:par>
+                                <p:cTn id="5" presetID="10" presetClass="entr" presetSubtype="0" fill="hold" grpId="0" nodeType="clickEffect">
+                                  <p:stCondLst>
+                                    <p:cond delay="0"/>
+                                  </p:stCondLst>
+                                  <p:childTnLst>
+                                    <p:set>
+                                      <p:cBhvr>
+                                        <p:cTn id="6" dur="1" fill="hold">
+                                          <p:stCondLst>
+                                            <p:cond delay="0"/>
+                                          </p:stCondLst>
+                                        </p:cTn>
+                                        <p:tgtEl>
+                                          <p:spTgt spid="4"/>
+                                        </p:tgtEl>
+                                        <p:attrNameLst>
+                                          <p:attrName>style.visibility</p:attrName>
+                                        </p:attrNameLst>
+                                      </p:cBhvr>
+                                      <p:to>
+                                        <p:strVal val="visible"/>
+                                      </p:to>
+                                    </p:set>
+                                    <p:animEffect transition="in" filter="fade">
+                                      <p:cBhvr>
+                                        <p:cTn id="7" dur="500"/>
+                                        <p:tgtEl>
+                                          <p:spTgt spid="4"/>
+                                        </p:tgtEl>
+                                      </p:cBhvr>
+                                    </p:animEffect>
+                                  </p:childTnLst>
+                                </p:cTn>
+                              </p:par>
+                            </p:childTnLst>
+                          </p:cTn>
+                        </p:par>
+                      </p:childTnLst>
+                    </p:cTn>
+                  </p:par>
+                </p:childTnLst>
+              </p:cTn>
+              <p:prevCondLst>
+                <p:cond evt="onPrev" delay="0">
+                  <p:tgtEl>
+                    <p:sldTgt/>
+                  </p:tgtEl>
+                </p:cond>
+              </p:prevCondLst>
+              <p:nextCondLst>
+                <p:cond evt="onNext" delay="0">
+                  <p:tgtEl>
+                    <p:sldTgt/>
+                  </p:tgtEl>
+                </p:cond>
+              </p:nextCondLst>
+            </p:seq>
+          </p:childTnLst>
+        </p:cTn>
+      </p:par>
+    </p:tnLst>
+    <p:bldLst>
+      <p:bldP spid="4" grpId="0"/>
+    </p:bldLst>
+  </p:timing>
+</p:sld>
+</file>
+
+<file path=ppt/slides/slide17.xml><?xml version="1.0" encoding="utf-8"?>
+<p:sld xmlns:a="http://schemas.openxmlformats.org/drawingml/2006/main" xmlns:r="http://schemas.openxmlformats.org/officeDocument/2006/relationships" xmlns:p="http://schemas.openxmlformats.org/presentationml/2006/main">
+  <p:cSld>
+    <p:spTree>
+      <p:nvGrpSpPr>
+        <p:cNvPr id="1" name=""/>
+        <p:cNvGrpSpPr/>
+        <p:nvPr/>
+      </p:nvGrpSpPr>
+      <p:grpSpPr>
+        <a:xfrm>
+          <a:off x="0" y="0"/>
+          <a:ext cx="0" cy="0"/>
+          <a:chOff x="0" y="0"/>
+          <a:chExt cx="0" cy="0"/>
+        </a:xfrm>
+      </p:grpSpPr>
+      <p:sp>
+        <p:nvSpPr>
+          <p:cNvPr id="2" name="Title 1"/>
+          <p:cNvSpPr>
+            <a:spLocks noGrp="1"/>
+          </p:cNvSpPr>
+          <p:nvPr>
+            <p:ph type="title"/>
+          </p:nvPr>
+        </p:nvSpPr>
+        <p:spPr/>
+        <p:txBody>
+          <a:bodyPr/>
+          <a:lstStyle/>
+          <a:p>
+            <a:r>
+              <a:rPr lang="en-US" dirty="0" smtClean="0"/>
+              <a:t>What? Wait a minute…</a:t>
+            </a:r>
+            <a:endParaRPr lang="en-US" dirty="0"/>
+          </a:p>
+        </p:txBody>
+      </p:sp>
+      <p:sp>
+        <p:nvSpPr>
+          <p:cNvPr id="3" name="TextBox 2"/>
+          <p:cNvSpPr txBox="1"/>
+          <p:nvPr/>
+        </p:nvSpPr>
+        <p:spPr>
+          <a:xfrm>
+            <a:off x="762000" y="1981200"/>
+            <a:ext cx="7696200" cy="369332"/>
+          </a:xfrm>
+          <a:prstGeom prst="rect">
+            <a:avLst/>
+          </a:prstGeom>
+          <a:noFill/>
+        </p:spPr>
+        <p:txBody>
+          <a:bodyPr wrap="square" rtlCol="0">
+            <a:spAutoFit/>
+          </a:bodyPr>
+          <a:lstStyle/>
+          <a:p>
+            <a:r>
+              <a:rPr lang="en-US" dirty="0" smtClean="0"/>
+              <a:t>Yeah, Azure resource group templates.</a:t>
+            </a:r>
+            <a:endParaRPr lang="en-US" dirty="0"/>
+          </a:p>
+        </p:txBody>
+      </p:sp>
+      <p:pic>
+        <p:nvPicPr>
+          <p:cNvPr id="4" name="Picture 3"/>
+          <p:cNvPicPr>
+            <a:picLocks noChangeAspect="1"/>
+          </p:cNvPicPr>
+          <p:nvPr/>
+        </p:nvPicPr>
+        <p:blipFill>
+          <a:blip r:embed="rId2"/>
+          <a:stretch>
+            <a:fillRect/>
+          </a:stretch>
+        </p:blipFill>
+        <p:spPr>
+          <a:xfrm>
+            <a:off x="1609725" y="981075"/>
+            <a:ext cx="8972550" cy="4895850"/>
+          </a:xfrm>
+          <a:prstGeom prst="rect">
+            <a:avLst/>
+          </a:prstGeom>
+        </p:spPr>
+      </p:pic>
+    </p:spTree>
+    <p:extLst>
+      <p:ext uri="{BB962C8B-B14F-4D97-AF65-F5344CB8AC3E}">
+        <p14:creationId xmlns:p14="http://schemas.microsoft.com/office/powerpoint/2010/main" val="1933763642"/>
+      </p:ext>
+    </p:extLst>
+  </p:cSld>
+  <p:clrMapOvr>
+    <a:masterClrMapping/>
+  </p:clrMapOvr>
+  <mc:AlternateContent xmlns:mc="http://schemas.openxmlformats.org/markup-compatibility/2006" xmlns:p14="http://schemas.microsoft.com/office/powerpoint/2010/main">
+    <mc:Choice Requires="p14">
+      <p:transition spd="med" p14:dur="700">
+        <p:fade/>
+      </p:transition>
+    </mc:Choice>
+    <mc:Fallback xmlns="">
+      <p:transition spd="med">
+        <p:fade/>
+      </p:transition>
+    </mc:Fallback>
+  </mc:AlternateContent>
+  <p:timing>
+    <p:tnLst>
+      <p:par>
+        <p:cTn id="1" dur="indefinite" restart="never" nodeType="tmRoot">
+          <p:childTnLst>
+            <p:seq concurrent="1" nextAc="seek">
+              <p:cTn id="2" dur="indefinite" nodeType="mainSeq">
+                <p:childTnLst>
+                  <p:par>
+                    <p:cTn id="3" fill="hold">
+                      <p:stCondLst>
+                        <p:cond delay="indefinite"/>
+                      </p:stCondLst>
+                      <p:childTnLst>
+                        <p:par>
+                          <p:cTn id="4" fill="hold">
+                            <p:stCondLst>
+                              <p:cond delay="0"/>
+                            </p:stCondLst>
+                            <p:childTnLst>
+                              <p:par>
+                                <p:cTn id="5" presetID="10" presetClass="entr" presetSubtype="0" fill="hold" nodeType="clickEffect">
+                                  <p:stCondLst>
+                                    <p:cond delay="0"/>
+                                  </p:stCondLst>
+                                  <p:childTnLst>
+                                    <p:set>
+                                      <p:cBhvr>
+                                        <p:cTn id="6" dur="1" fill="hold">
+                                          <p:stCondLst>
+                                            <p:cond delay="0"/>
+                                          </p:stCondLst>
+                                        </p:cTn>
+                                        <p:tgtEl>
+                                          <p:spTgt spid="4"/>
+                                        </p:tgtEl>
+                                        <p:attrNameLst>
+                                          <p:attrName>style.visibility</p:attrName>
+                                        </p:attrNameLst>
+                                      </p:cBhvr>
+                                      <p:to>
+                                        <p:strVal val="visible"/>
+                                      </p:to>
+                                    </p:set>
+                                    <p:animEffect transition="in" filter="fade">
+                                      <p:cBhvr>
+                                        <p:cTn id="7" dur="500"/>
+                                        <p:tgtEl>
+                                          <p:spTgt spid="4"/>
+                                        </p:tgtEl>
+                                      </p:cBhvr>
+                                    </p:animEffect>
+                                  </p:childTnLst>
+                                </p:cTn>
+                              </p:par>
+                            </p:childTnLst>
+                          </p:cTn>
+                        </p:par>
+                      </p:childTnLst>
+                    </p:cTn>
+                  </p:par>
+                </p:childTnLst>
+              </p:cTn>
+              <p:prevCondLst>
+                <p:cond evt="onPrev" delay="0">
+                  <p:tgtEl>
+                    <p:sldTgt/>
+                  </p:tgtEl>
+                </p:cond>
+              </p:prevCondLst>
+              <p:nextCondLst>
+                <p:cond evt="onNext" delay="0">
+                  <p:tgtEl>
+                    <p:sldTgt/>
+                  </p:tgtEl>
+                </p:cond>
+              </p:nextCondLst>
+            </p:seq>
+          </p:childTnLst>
+        </p:cTn>
+      </p:par>
+    </p:tnLst>
+  </p:timing>
+</p:sld>
+</file>
+
+<file path=ppt/slides/slide18.xml><?xml version="1.0" encoding="utf-8"?>
+<p:sld xmlns:a="http://schemas.openxmlformats.org/drawingml/2006/main" xmlns:r="http://schemas.openxmlformats.org/officeDocument/2006/relationships" xmlns:p="http://schemas.openxmlformats.org/presentationml/2006/main">
+  <p:cSld>
+    <p:spTree>
+      <p:nvGrpSpPr>
+        <p:cNvPr id="1" name=""/>
+        <p:cNvGrpSpPr/>
+        <p:nvPr/>
+      </p:nvGrpSpPr>
+      <p:grpSpPr>
+        <a:xfrm>
+          <a:off x="0" y="0"/>
+          <a:ext cx="0" cy="0"/>
+          <a:chOff x="0" y="0"/>
+          <a:chExt cx="0" cy="0"/>
+        </a:xfrm>
+      </p:grpSpPr>
+      <p:pic>
+        <p:nvPicPr>
+          <p:cNvPr id="2" name="Picture 1"/>
+          <p:cNvPicPr>
+            <a:picLocks noChangeAspect="1"/>
+          </p:cNvPicPr>
+          <p:nvPr/>
+        </p:nvPicPr>
+        <p:blipFill>
+          <a:blip r:embed="rId2"/>
+          <a:stretch>
+            <a:fillRect/>
+          </a:stretch>
+        </p:blipFill>
+        <p:spPr>
+          <a:xfrm>
+            <a:off x="-4763" y="233362"/>
+            <a:ext cx="12201525" cy="6391275"/>
+          </a:xfrm>
+          <a:prstGeom prst="rect">
+            <a:avLst/>
+          </a:prstGeom>
+        </p:spPr>
+      </p:pic>
+    </p:spTree>
+    <p:extLst>
+      <p:ext uri="{BB962C8B-B14F-4D97-AF65-F5344CB8AC3E}">
+        <p14:creationId xmlns:p14="http://schemas.microsoft.com/office/powerpoint/2010/main" val="4129439513"/>
+      </p:ext>
+    </p:extLst>
+  </p:cSld>
+  <p:clrMapOvr>
+    <a:masterClrMapping/>
+  </p:clrMapOvr>
+  <mc:AlternateContent xmlns:mc="http://schemas.openxmlformats.org/markup-compatibility/2006" xmlns:p14="http://schemas.microsoft.com/office/powerpoint/2010/main">
+    <mc:Choice Requires="p14">
+      <p:transition spd="med" p14:dur="700">
+        <p:fade/>
+      </p:transition>
+    </mc:Choice>
+    <mc:Fallback xmlns="">
+      <p:transition spd="med">
+        <p:fade/>
+      </p:transition>
+    </mc:Fallback>
+  </mc:AlternateContent>
+  <p:timing>
+    <p:tnLst>
+      <p:par>
+        <p:cTn id="1" dur="indefinite" restart="never" nodeType="tmRoot"/>
+      </p:par>
+    </p:tnLst>
+  </p:timing>
+</p:sld>
+</file>
+
 <file path=ppt/slides/slide19.xml><?xml version="1.0" encoding="utf-8"?>
 <p:sld xmlns:a="http://schemas.openxmlformats.org/drawingml/2006/main" xmlns:r="http://schemas.openxmlformats.org/officeDocument/2006/relationships" xmlns:p="http://schemas.openxmlformats.org/presentationml/2006/main">
   <p:cSld>
@@ -12047,7 +12154,57 @@
           <a:p>
             <a:r>
               <a:rPr lang="en-US" dirty="0" smtClean="0"/>
-              <a:t>Questions? We could talk in detail for hours….</a:t>
+              <a:t>Demo time</a:t>
+            </a:r>
+            <a:endParaRPr lang="en-US" dirty="0"/>
+          </a:p>
+        </p:txBody>
+      </p:sp>
+      <p:sp>
+        <p:nvSpPr>
+          <p:cNvPr id="3" name="Content Placeholder 2"/>
+          <p:cNvSpPr>
+            <a:spLocks noGrp="1"/>
+          </p:cNvSpPr>
+          <p:nvPr>
+            <p:ph idx="1"/>
+          </p:nvPr>
+        </p:nvSpPr>
+        <p:spPr/>
+        <p:txBody>
+          <a:bodyPr/>
+          <a:lstStyle/>
+          <a:p>
+            <a:endParaRPr lang="en-US" dirty="0"/>
+          </a:p>
+        </p:txBody>
+      </p:sp>
+      <p:sp>
+        <p:nvSpPr>
+          <p:cNvPr id="4" name="Text Placeholder 3"/>
+          <p:cNvSpPr>
+            <a:spLocks noGrp="1"/>
+          </p:cNvSpPr>
+          <p:nvPr>
+            <p:ph type="body" sz="half" idx="2"/>
+          </p:nvPr>
+        </p:nvSpPr>
+        <p:spPr/>
+        <p:txBody>
+          <a:bodyPr/>
+          <a:lstStyle/>
+          <a:p>
+            <a:r>
+              <a:rPr lang="en-US" dirty="0" smtClean="0"/>
+              <a:t>DCOS-driven </a:t>
+            </a:r>
+            <a:r>
+              <a:rPr lang="en-US" dirty="0" err="1" smtClean="0"/>
+              <a:t>mesos</a:t>
+            </a:r>
+            <a:r>
+              <a:rPr lang="en-US" dirty="0" smtClean="0"/>
+              <a:t> cluster from mesosphere</a:t>
             </a:r>
             <a:endParaRPr lang="en-US" dirty="0"/>
           </a:p>
@@ -12056,7 +12213,7 @@
     </p:spTree>
     <p:extLst>
       <p:ext uri="{BB962C8B-B14F-4D97-AF65-F5344CB8AC3E}">
-        <p14:creationId xmlns:p14="http://schemas.microsoft.com/office/powerpoint/2010/main" val="1933763642"/>
+        <p14:creationId xmlns:p14="http://schemas.microsoft.com/office/powerpoint/2010/main" val="1827431122"/>
       </p:ext>
     </p:extLst>
   </p:cSld>
@@ -12221,10 +12378,56 @@
           <a:chExt cx="0" cy="0"/>
         </a:xfrm>
       </p:grpSpPr>
+      <p:sp>
+        <p:nvSpPr>
+          <p:cNvPr id="2" name="Title 1"/>
+          <p:cNvSpPr>
+            <a:spLocks noGrp="1"/>
+          </p:cNvSpPr>
+          <p:nvPr>
+            <p:ph type="title"/>
+          </p:nvPr>
+        </p:nvSpPr>
+        <p:spPr/>
+        <p:txBody>
+          <a:bodyPr/>
+          <a:lstStyle/>
+          <a:p>
+            <a:r>
+              <a:rPr lang="en-US" dirty="0" smtClean="0"/>
+              <a:t>Docker at Microsoft</a:t>
+            </a:r>
+            <a:endParaRPr lang="en-US" dirty="0"/>
+          </a:p>
+        </p:txBody>
+      </p:sp>
+      <p:sp>
+        <p:nvSpPr>
+          <p:cNvPr id="3" name="Text Placeholder 2"/>
+          <p:cNvSpPr>
+            <a:spLocks noGrp="1"/>
+          </p:cNvSpPr>
+          <p:nvPr>
+            <p:ph type="body" idx="1"/>
+          </p:nvPr>
+        </p:nvSpPr>
+        <p:spPr/>
+        <p:txBody>
+          <a:bodyPr/>
+          <a:lstStyle/>
+          <a:p>
+            <a:r>
+              <a:rPr lang="en-US" dirty="0" smtClean="0"/>
+              <a:t>This is more than just Azure</a:t>
+            </a:r>
+            <a:endParaRPr lang="en-US" dirty="0"/>
+          </a:p>
+        </p:txBody>
+      </p:sp>
     </p:spTree>
     <p:extLst>
       <p:ext uri="{BB962C8B-B14F-4D97-AF65-F5344CB8AC3E}">
-        <p14:creationId xmlns:p14="http://schemas.microsoft.com/office/powerpoint/2010/main" val="4129439513"/>
+        <p14:creationId xmlns:p14="http://schemas.microsoft.com/office/powerpoint/2010/main" val="1037525229"/>
       </p:ext>
     </p:extLst>
   </p:cSld>
@@ -12285,52 +12488,226 @@
           <a:bodyPr/>
           <a:lstStyle/>
           <a:p>
-            <a:endParaRPr lang="en-US"/>
-          </a:p>
-        </p:txBody>
-      </p:sp>
-      <p:sp>
-        <p:nvSpPr>
-          <p:cNvPr id="3" name="Content Placeholder 2"/>
-          <p:cNvSpPr>
-            <a:spLocks noGrp="1"/>
-          </p:cNvSpPr>
-          <p:nvPr>
-            <p:ph idx="1"/>
-          </p:nvPr>
-        </p:nvSpPr>
-        <p:spPr/>
-        <p:txBody>
-          <a:bodyPr/>
+            <a:r>
+              <a:rPr lang="en-US" dirty="0" smtClean="0"/>
+              <a:t>Docker at Microsoft</a:t>
+            </a:r>
+            <a:endParaRPr lang="en-US" dirty="0"/>
+          </a:p>
+        </p:txBody>
+      </p:sp>
+      <p:sp>
+        <p:nvSpPr>
+          <p:cNvPr id="9" name="TextBox 8"/>
+          <p:cNvSpPr txBox="1"/>
+          <p:nvPr/>
+        </p:nvSpPr>
+        <p:spPr>
+          <a:xfrm>
+            <a:off x="990600" y="2133600"/>
+            <a:ext cx="9448800" cy="3693319"/>
+          </a:xfrm>
+          <a:prstGeom prst="rect">
+            <a:avLst/>
+          </a:prstGeom>
+          <a:noFill/>
+        </p:spPr>
+        <p:txBody>
+          <a:bodyPr wrap="square" rtlCol="0">
+            <a:spAutoFit/>
+          </a:bodyPr>
           <a:lstStyle/>
           <a:p>
-            <a:endParaRPr lang="en-US"/>
-          </a:p>
-        </p:txBody>
-      </p:sp>
-      <p:sp>
-        <p:nvSpPr>
-          <p:cNvPr id="4" name="Text Placeholder 3"/>
-          <p:cNvSpPr>
-            <a:spLocks noGrp="1"/>
-          </p:cNvSpPr>
-          <p:nvPr>
-            <p:ph type="body" sz="half" idx="2"/>
-          </p:nvPr>
-        </p:nvSpPr>
-        <p:spPr/>
-        <p:txBody>
-          <a:bodyPr/>
-          <a:lstStyle/>
-          <a:p>
-            <a:endParaRPr lang="en-US"/>
+            <a:pPr marL="285750" indent="-285750">
+              <a:buFont typeface="Arial" panose="020B0604020202020204" pitchFamily="34" charset="0"/>
+              <a:buChar char="•"/>
+            </a:pPr>
+            <a:r>
+              <a:rPr lang="en-US" dirty="0" smtClean="0"/>
+              <a:t>Implemented a Windows native </a:t>
+            </a:r>
+            <a:r>
+              <a:rPr lang="en-US" dirty="0" err="1" smtClean="0"/>
+              <a:t>docker</a:t>
+            </a:r>
+            <a:r>
+              <a:rPr lang="en-US" dirty="0" smtClean="0"/>
+              <a:t> client in .NET</a:t>
+            </a:r>
+          </a:p>
+          <a:p>
+            <a:pPr marL="285750" indent="-285750">
+              <a:buFont typeface="Arial" panose="020B0604020202020204" pitchFamily="34" charset="0"/>
+              <a:buChar char="•"/>
+            </a:pPr>
+            <a:r>
+              <a:rPr lang="en-US" dirty="0" smtClean="0"/>
+              <a:t>Implementing a Docker image container service in Windows Server</a:t>
+            </a:r>
+          </a:p>
+          <a:p>
+            <a:pPr marL="285750" indent="-285750">
+              <a:buFont typeface="Arial" panose="020B0604020202020204" pitchFamily="34" charset="0"/>
+              <a:buChar char="•"/>
+            </a:pPr>
+            <a:r>
+              <a:rPr lang="en-US" dirty="0" smtClean="0"/>
+              <a:t>Implemented support for private, signed </a:t>
+            </a:r>
+            <a:r>
+              <a:rPr lang="en-US" dirty="0" err="1" smtClean="0"/>
+              <a:t>docker</a:t>
+            </a:r>
+            <a:r>
+              <a:rPr lang="en-US" dirty="0" smtClean="0"/>
+              <a:t> image registries in Azure Storage for private, verified, and controlled image repositories</a:t>
+            </a:r>
+          </a:p>
+          <a:p>
+            <a:pPr marL="285750" indent="-285750">
+              <a:buFont typeface="Arial" panose="020B0604020202020204" pitchFamily="34" charset="0"/>
+              <a:buChar char="•"/>
+            </a:pPr>
+            <a:r>
+              <a:rPr lang="en-US" dirty="0" smtClean="0"/>
+              <a:t>Support for </a:t>
+            </a:r>
+            <a:r>
+              <a:rPr lang="en-US" dirty="0" err="1" smtClean="0"/>
+              <a:t>docker</a:t>
+            </a:r>
+            <a:r>
+              <a:rPr lang="en-US" dirty="0" smtClean="0"/>
+              <a:t> machine, </a:t>
+            </a:r>
+            <a:r>
+              <a:rPr lang="en-US" dirty="0" err="1" smtClean="0"/>
+              <a:t>docker</a:t>
+            </a:r>
+            <a:r>
+              <a:rPr lang="en-US" dirty="0" smtClean="0"/>
+              <a:t> swarm, and </a:t>
+            </a:r>
+            <a:r>
+              <a:rPr lang="en-US" dirty="0" err="1" smtClean="0"/>
+              <a:t>docker</a:t>
+            </a:r>
+            <a:r>
+              <a:rPr lang="en-US" dirty="0" smtClean="0"/>
+              <a:t> compose</a:t>
+            </a:r>
+          </a:p>
+          <a:p>
+            <a:pPr marL="285750" indent="-285750">
+              <a:buFont typeface="Arial" panose="020B0604020202020204" pitchFamily="34" charset="0"/>
+              <a:buChar char="•"/>
+            </a:pPr>
+            <a:r>
+              <a:rPr lang="en-US" dirty="0" smtClean="0"/>
+              <a:t>Support for specialized </a:t>
+            </a:r>
+            <a:r>
+              <a:rPr lang="en-US" dirty="0" err="1" smtClean="0"/>
+              <a:t>docker</a:t>
+            </a:r>
+            <a:r>
+              <a:rPr lang="en-US" dirty="0" smtClean="0"/>
+              <a:t> and </a:t>
+            </a:r>
+            <a:r>
+              <a:rPr lang="en-US" dirty="0" err="1" smtClean="0"/>
+              <a:t>linux</a:t>
+            </a:r>
+            <a:r>
+              <a:rPr lang="en-US" dirty="0" smtClean="0"/>
+              <a:t> container images:</a:t>
+            </a:r>
+          </a:p>
+          <a:p>
+            <a:pPr marL="742950" lvl="1" indent="-285750">
+              <a:buFont typeface="Arial" panose="020B0604020202020204" pitchFamily="34" charset="0"/>
+              <a:buChar char="•"/>
+            </a:pPr>
+            <a:r>
+              <a:rPr lang="en-US" dirty="0" smtClean="0"/>
+              <a:t>CoreOS</a:t>
+            </a:r>
+          </a:p>
+          <a:p>
+            <a:pPr marL="742950" lvl="1" indent="-285750">
+              <a:buFont typeface="Arial" panose="020B0604020202020204" pitchFamily="34" charset="0"/>
+              <a:buChar char="•"/>
+            </a:pPr>
+            <a:r>
+              <a:rPr lang="en-US" dirty="0" smtClean="0"/>
+              <a:t>Ubuntu Core and Snappy</a:t>
+            </a:r>
+          </a:p>
+          <a:p>
+            <a:pPr marL="742950" lvl="1" indent="-285750">
+              <a:buFont typeface="Arial" panose="020B0604020202020204" pitchFamily="34" charset="0"/>
+              <a:buChar char="•"/>
+            </a:pPr>
+            <a:r>
+              <a:rPr lang="en-US" dirty="0" smtClean="0"/>
+              <a:t>Fleet</a:t>
+            </a:r>
+          </a:p>
+          <a:p>
+            <a:pPr marL="742950" lvl="1" indent="-285750">
+              <a:buFont typeface="Arial" panose="020B0604020202020204" pitchFamily="34" charset="0"/>
+              <a:buChar char="•"/>
+            </a:pPr>
+            <a:r>
+              <a:rPr lang="en-US" dirty="0" err="1" smtClean="0"/>
+              <a:t>Deis</a:t>
+            </a:r>
+            <a:r>
+              <a:rPr lang="en-US" dirty="0" smtClean="0"/>
+              <a:t> </a:t>
+            </a:r>
+          </a:p>
+          <a:p>
+            <a:pPr marL="742950" lvl="1" indent="-285750">
+              <a:buFont typeface="Arial" panose="020B0604020202020204" pitchFamily="34" charset="0"/>
+              <a:buChar char="•"/>
+            </a:pPr>
+            <a:r>
+              <a:rPr lang="en-US" dirty="0" smtClean="0"/>
+              <a:t>Weave</a:t>
+            </a:r>
+          </a:p>
+          <a:p>
+            <a:pPr marL="742950" lvl="1" indent="-285750">
+              <a:buFont typeface="Arial" panose="020B0604020202020204" pitchFamily="34" charset="0"/>
+              <a:buChar char="•"/>
+            </a:pPr>
+            <a:r>
+              <a:rPr lang="en-US" dirty="0" smtClean="0"/>
+              <a:t>Kubernetes</a:t>
+            </a:r>
+          </a:p>
+          <a:p>
+            <a:pPr marL="742950" lvl="1" indent="-285750">
+              <a:buFont typeface="Arial" panose="020B0604020202020204" pitchFamily="34" charset="0"/>
+              <a:buChar char="•"/>
+            </a:pPr>
+            <a:r>
+              <a:rPr lang="en-US" dirty="0" err="1" smtClean="0"/>
+              <a:t>Mesos</a:t>
+            </a:r>
+            <a:r>
+              <a:rPr lang="en-US" dirty="0" smtClean="0"/>
+              <a:t> </a:t>
+            </a:r>
+            <a:endParaRPr lang="en-US" dirty="0"/>
           </a:p>
         </p:txBody>
       </p:sp>
     </p:spTree>
     <p:extLst>
       <p:ext uri="{BB962C8B-B14F-4D97-AF65-F5344CB8AC3E}">
-        <p14:creationId xmlns:p14="http://schemas.microsoft.com/office/powerpoint/2010/main" val="1827431122"/>
+        <p14:creationId xmlns:p14="http://schemas.microsoft.com/office/powerpoint/2010/main" val="2756653274"/>
       </p:ext>
     </p:extLst>
   </p:cSld>
@@ -12391,45 +12768,48 @@
           <a:bodyPr/>
           <a:lstStyle/>
           <a:p>
-            <a:endParaRPr lang="en-US"/>
-          </a:p>
-        </p:txBody>
-      </p:sp>
-      <p:sp>
-        <p:nvSpPr>
-          <p:cNvPr id="3" name="Picture Placeholder 2"/>
-          <p:cNvSpPr>
-            <a:spLocks noGrp="1"/>
-          </p:cNvSpPr>
-          <p:nvPr>
-            <p:ph type="pic" idx="1"/>
-          </p:nvPr>
-        </p:nvSpPr>
-        <p:spPr/>
-      </p:sp>
-      <p:sp>
-        <p:nvSpPr>
-          <p:cNvPr id="4" name="Text Placeholder 3"/>
-          <p:cNvSpPr>
-            <a:spLocks noGrp="1"/>
-          </p:cNvSpPr>
-          <p:nvPr>
-            <p:ph type="body" sz="half" idx="2"/>
-          </p:nvPr>
-        </p:nvSpPr>
-        <p:spPr/>
-        <p:txBody>
-          <a:bodyPr/>
-          <a:lstStyle/>
-          <a:p>
-            <a:endParaRPr lang="en-US"/>
-          </a:p>
-        </p:txBody>
-      </p:sp>
+            <a:r>
+              <a:rPr lang="en-US" dirty="0" smtClean="0"/>
+              <a:t>Who’s the top contributor to Docker? </a:t>
+            </a:r>
+            <a:r>
+              <a:rPr lang="en-US" dirty="0" smtClean="0">
+                <a:sym typeface="Wingdings" panose="05000000000000000000" pitchFamily="2" charset="2"/>
+              </a:rPr>
+              <a:t></a:t>
+            </a:r>
+            <a:endParaRPr lang="en-US" dirty="0"/>
+          </a:p>
+        </p:txBody>
+      </p:sp>
+      <p:pic>
+        <p:nvPicPr>
+          <p:cNvPr id="3" name="Picture 2"/>
+          <p:cNvPicPr>
+            <a:picLocks noChangeAspect="1"/>
+          </p:cNvPicPr>
+          <p:nvPr/>
+        </p:nvPicPr>
+        <p:blipFill>
+          <a:blip r:embed="rId2"/>
+          <a:stretch>
+            <a:fillRect/>
+          </a:stretch>
+        </p:blipFill>
+        <p:spPr>
+          <a:xfrm>
+            <a:off x="1981200" y="1676400"/>
+            <a:ext cx="7672237" cy="4959003"/>
+          </a:xfrm>
+          <a:prstGeom prst="rect">
+            <a:avLst/>
+          </a:prstGeom>
+        </p:spPr>
+      </p:pic>
     </p:spTree>
     <p:extLst>
       <p:ext uri="{BB962C8B-B14F-4D97-AF65-F5344CB8AC3E}">
-        <p14:creationId xmlns:p14="http://schemas.microsoft.com/office/powerpoint/2010/main" val="2521986180"/>
+        <p14:creationId xmlns:p14="http://schemas.microsoft.com/office/powerpoint/2010/main" val="1076242998"/>
       </p:ext>
     </p:extLst>
   </p:cSld>
@@ -12451,7 +12831,83 @@
   <p:timing>
     <p:tnLst>
       <p:par>
-        <p:cTn id="1" dur="indefinite" restart="never" nodeType="tmRoot"/>
+        <p:cTn id="1" dur="indefinite" restart="never" nodeType="tmRoot">
+          <p:childTnLst>
+            <p:seq concurrent="1" nextAc="seek">
+              <p:cTn id="2" dur="indefinite" nodeType="mainSeq">
+                <p:childTnLst>
+                  <p:par>
+                    <p:cTn id="3" fill="hold">
+                      <p:stCondLst>
+                        <p:cond delay="indefinite"/>
+                      </p:stCondLst>
+                      <p:childTnLst>
+                        <p:par>
+                          <p:cTn id="4" fill="hold">
+                            <p:stCondLst>
+                              <p:cond delay="0"/>
+                            </p:stCondLst>
+                            <p:childTnLst>
+                              <p:par>
+                                <p:cTn id="5" presetID="10" presetClass="entr" presetSubtype="0" fill="hold" nodeType="clickEffect">
+                                  <p:stCondLst>
+                                    <p:cond delay="0"/>
+                                  </p:stCondLst>
+                                  <p:childTnLst>
+                                    <p:set>
+                                      <p:cBhvr>
+                                        <p:cTn id="6" dur="1" fill="hold">
+                                          <p:stCondLst>
+                                            <p:cond delay="0"/>
+                                          </p:stCondLst>
+                                        </p:cTn>
+                                        <p:tgtEl>
+                                          <p:spTgt spid="3"/>
+                                        </p:tgtEl>
+                                        <p:attrNameLst>
+                                          <p:attrName>style.visibility</p:attrName>
+                                        </p:attrNameLst>
+                                      </p:cBhvr>
+                                      <p:to>
+                                        <p:strVal val="visible"/>
+                                      </p:to>
+                                    </p:set>
+                                    <p:animEffect transition="in" filter="fade">
+                                      <p:cBhvr>
+                                        <p:cTn id="7" dur="500"/>
+                                        <p:tgtEl>
+                                          <p:spTgt spid="3"/>
+                                        </p:tgtEl>
+                                      </p:cBhvr>
+                                    </p:animEffect>
+                                  </p:childTnLst>
+                                </p:cTn>
+                              </p:par>
+                            </p:childTnLst>
+                          </p:cTn>
+                        </p:par>
+                      </p:childTnLst>
+                    </p:cTn>
+                  </p:par>
+                </p:childTnLst>
+              </p:cTn>
+              <p:prevCondLst>
+                <p:cond evt="onPrev" delay="0">
+                  <p:tgtEl>
+                    <p:sldTgt/>
+                  </p:tgtEl>
+                </p:cond>
+              </p:prevCondLst>
+              <p:nextCondLst>
+                <p:cond evt="onNext" delay="0">
+                  <p:tgtEl>
+                    <p:sldTgt/>
+                  </p:tgtEl>
+                </p:cond>
+              </p:nextCondLst>
+            </p:seq>
+          </p:childTnLst>
+        </p:cTn>
       </p:par>
     </p:tnLst>
   </p:timing>
@@ -12630,13 +13086,8 @@
           <a:p>
             <a:r>
               <a:rPr lang="en-US" dirty="0" smtClean="0"/>
-              <a:t>Standard format everyone agrees </a:t>
-            </a:r>
-            <a:r>
-              <a:rPr lang="en-US" dirty="0" smtClean="0"/>
-              <a:t>on*****</a:t>
-            </a:r>
-            <a:endParaRPr lang="en-US" dirty="0" smtClean="0"/>
+              <a:t>Standard format everyone agrees on*****</a:t>
+            </a:r>
           </a:p>
           <a:p>
             <a:r>
@@ -12795,11 +13246,7 @@
           <a:p>
             <a:r>
               <a:rPr lang="en-US" dirty="0" smtClean="0"/>
-              <a:t>Process isolation &amp; basic </a:t>
-            </a:r>
-            <a:r>
-              <a:rPr lang="en-US" dirty="0" smtClean="0"/>
-              <a:t>security</a:t>
+              <a:t>Process isolation &amp; basic security</a:t>
             </a:r>
           </a:p>
           <a:p>
@@ -12807,7 +13254,6 @@
               <a:rPr lang="en-US" dirty="0" smtClean="0"/>
               <a:t>Compute density and control</a:t>
             </a:r>
-            <a:endParaRPr lang="en-US" dirty="0" smtClean="0"/>
           </a:p>
         </p:txBody>
       </p:sp>
@@ -13532,13 +13978,13 @@
   <p:clrMapOvr>
     <a:masterClrMapping/>
   </p:clrMapOvr>
-  <mc:AlternateContent xmlns:mc="http://schemas.openxmlformats.org/markup-compatibility/2006">
-    <mc:Choice xmlns:p14="http://schemas.microsoft.com/office/powerpoint/2010/main" Requires="p14">
+  <mc:AlternateContent xmlns:mc="http://schemas.openxmlformats.org/markup-compatibility/2006" xmlns:p14="http://schemas.microsoft.com/office/powerpoint/2010/main">
+    <mc:Choice Requires="p14">
       <p:transition spd="med" p14:dur="700">
         <p:fade/>
       </p:transition>
     </mc:Choice>
-    <mc:Fallback>
+    <mc:Fallback xmlns="">
       <p:transition spd="med">
         <p:fade/>
       </p:transition>

</xml_diff>

<commit_message>
more additions and modifications
</commit_message>
<xml_diff>
--- a/Containers and Clusters in Azure.pptx
+++ b/Containers and Clusters in Azure.pptx
@@ -3230,7 +3230,7 @@
           <a:p>
             <a:fld id="{061C5132-FFA3-4B02-9F09-22FCF40EFA74}" type="datetimeFigureOut">
               <a:rPr lang="en-US" smtClean="0"/>
-              <a:t>5/9/2015</a:t>
+              <a:t>5/11/2015</a:t>
             </a:fld>
             <a:endParaRPr lang="en-US"/>
           </a:p>
@@ -3395,7 +3395,7 @@
           <a:p>
             <a:fld id="{0B6E42C9-243F-4DC5-AFF6-9D56B5FA9D63}" type="datetimeFigureOut">
               <a:rPr lang="en-US" smtClean="0"/>
-              <a:t>5/9/2015</a:t>
+              <a:t>5/11/2015</a:t>
             </a:fld>
             <a:endParaRPr lang="en-US"/>
           </a:p>
@@ -3849,7 +3849,7 @@
           <a:p>
             <a:fld id="{4AAD347D-5ACD-4C99-B74B-A9C85AD731AF}" type="datetimeFigureOut">
               <a:rPr lang="en-US" dirty="0"/>
-              <a:t>5/9/2015</a:t>
+              <a:t>5/11/2015</a:t>
             </a:fld>
             <a:endParaRPr lang="en-US" dirty="0"/>
           </a:p>
@@ -4144,7 +4144,7 @@
             <a:fld id="{B0FE2824-C2A0-4931-BB32-60B24BDBB3CC}" type="datetimeFigureOut">
               <a:rPr lang="en-US" smtClean="0"/>
               <a:pPr/>
-              <a:t>5/9/2015</a:t>
+              <a:t>5/11/2015</a:t>
             </a:fld>
             <a:endParaRPr lang="en-US"/>
           </a:p>
@@ -4340,7 +4340,7 @@
             <a:fld id="{B0FE2824-C2A0-4931-BB32-60B24BDBB3CC}" type="datetimeFigureOut">
               <a:rPr lang="en-US" smtClean="0"/>
               <a:pPr/>
-              <a:t>5/9/2015</a:t>
+              <a:t>5/11/2015</a:t>
             </a:fld>
             <a:endParaRPr lang="en-US"/>
           </a:p>
@@ -4615,7 +4615,7 @@
             <a:fld id="{B0FE2824-C2A0-4931-BB32-60B24BDBB3CC}" type="datetimeFigureOut">
               <a:rPr lang="en-US" smtClean="0"/>
               <a:pPr/>
-              <a:t>5/9/2015</a:t>
+              <a:t>5/11/2015</a:t>
             </a:fld>
             <a:endParaRPr lang="en-US"/>
           </a:p>
@@ -4958,7 +4958,7 @@
             <a:fld id="{B0FE2824-C2A0-4931-BB32-60B24BDBB3CC}" type="datetimeFigureOut">
               <a:rPr lang="en-US" smtClean="0"/>
               <a:pPr/>
-              <a:t>5/9/2015</a:t>
+              <a:t>5/11/2015</a:t>
             </a:fld>
             <a:endParaRPr lang="en-US"/>
           </a:p>
@@ -5583,7 +5583,7 @@
             <a:fld id="{B0FE2824-C2A0-4931-BB32-60B24BDBB3CC}" type="datetimeFigureOut">
               <a:rPr lang="en-US" smtClean="0"/>
               <a:pPr/>
-              <a:t>5/9/2015</a:t>
+              <a:t>5/11/2015</a:t>
             </a:fld>
             <a:endParaRPr lang="en-US"/>
           </a:p>
@@ -6445,7 +6445,7 @@
             <a:fld id="{B0FE2824-C2A0-4931-BB32-60B24BDBB3CC}" type="datetimeFigureOut">
               <a:rPr lang="en-US" smtClean="0"/>
               <a:pPr/>
-              <a:t>5/9/2015</a:t>
+              <a:t>5/11/2015</a:t>
             </a:fld>
             <a:endParaRPr lang="en-US"/>
           </a:p>
@@ -6616,7 +6616,7 @@
           <a:p>
             <a:fld id="{B0FE2824-C2A0-4931-BB32-60B24BDBB3CC}" type="datetimeFigureOut">
               <a:rPr lang="en-US" smtClean="0"/>
-              <a:t>5/9/2015</a:t>
+              <a:t>5/11/2015</a:t>
             </a:fld>
             <a:endParaRPr lang="en-US"/>
           </a:p>
@@ -6815,7 +6815,7 @@
           <a:p>
             <a:fld id="{B0FE2824-C2A0-4931-BB32-60B24BDBB3CC}" type="datetimeFigureOut">
               <a:rPr lang="en-US" smtClean="0"/>
-              <a:t>5/9/2015</a:t>
+              <a:t>5/11/2015</a:t>
             </a:fld>
             <a:endParaRPr lang="en-US"/>
           </a:p>
@@ -7004,7 +7004,7 @@
           <a:p>
             <a:fld id="{B0FE2824-C2A0-4931-BB32-60B24BDBB3CC}" type="datetimeFigureOut">
               <a:rPr lang="en-US" smtClean="0"/>
-              <a:t>5/9/2015</a:t>
+              <a:t>5/11/2015</a:t>
             </a:fld>
             <a:endParaRPr lang="en-US"/>
           </a:p>
@@ -7270,7 +7270,7 @@
           <a:p>
             <a:fld id="{9796027F-7875-4030-9381-8BD8C4F21935}" type="datetimeFigureOut">
               <a:rPr lang="en-US" dirty="0"/>
-              <a:t>5/9/2015</a:t>
+              <a:t>5/11/2015</a:t>
             </a:fld>
             <a:endParaRPr lang="en-US" dirty="0"/>
           </a:p>
@@ -7581,7 +7581,7 @@
           <a:p>
             <a:fld id="{B0FE2824-C2A0-4931-BB32-60B24BDBB3CC}" type="datetimeFigureOut">
               <a:rPr lang="en-US" smtClean="0"/>
-              <a:t>5/9/2015</a:t>
+              <a:t>5/11/2015</a:t>
             </a:fld>
             <a:endParaRPr lang="en-US"/>
           </a:p>
@@ -8044,7 +8044,7 @@
           <a:p>
             <a:fld id="{B0FE2824-C2A0-4931-BB32-60B24BDBB3CC}" type="datetimeFigureOut">
               <a:rPr lang="en-US" smtClean="0"/>
-              <a:t>5/9/2015</a:t>
+              <a:t>5/11/2015</a:t>
             </a:fld>
             <a:endParaRPr lang="en-US"/>
           </a:p>
@@ -8181,7 +8181,7 @@
           <a:p>
             <a:fld id="{B0FE2824-C2A0-4931-BB32-60B24BDBB3CC}" type="datetimeFigureOut">
               <a:rPr lang="en-US" smtClean="0"/>
-              <a:t>5/9/2015</a:t>
+              <a:t>5/11/2015</a:t>
             </a:fld>
             <a:endParaRPr lang="en-US"/>
           </a:p>
@@ -8295,7 +8295,7 @@
           <a:p>
             <a:fld id="{B0FE2824-C2A0-4931-BB32-60B24BDBB3CC}" type="datetimeFigureOut">
               <a:rPr lang="en-US" smtClean="0"/>
-              <a:t>5/9/2015</a:t>
+              <a:t>5/11/2015</a:t>
             </a:fld>
             <a:endParaRPr lang="en-US"/>
           </a:p>
@@ -8593,7 +8593,7 @@
           <a:p>
             <a:fld id="{B0FE2824-C2A0-4931-BB32-60B24BDBB3CC}" type="datetimeFigureOut">
               <a:rPr lang="en-US" smtClean="0"/>
-              <a:t>5/9/2015</a:t>
+              <a:t>5/11/2015</a:t>
             </a:fld>
             <a:endParaRPr lang="en-US"/>
           </a:p>
@@ -8887,7 +8887,7 @@
           <a:p>
             <a:fld id="{B0FE2824-C2A0-4931-BB32-60B24BDBB3CC}" type="datetimeFigureOut">
               <a:rPr lang="en-US" smtClean="0"/>
-              <a:t>5/9/2015</a:t>
+              <a:t>5/11/2015</a:t>
             </a:fld>
             <a:endParaRPr lang="en-US"/>
           </a:p>
@@ -9336,7 +9336,7 @@
             <a:fld id="{B0FE2824-C2A0-4931-BB32-60B24BDBB3CC}" type="datetimeFigureOut">
               <a:rPr lang="en-US" smtClean="0"/>
               <a:pPr/>
-              <a:t>5/9/2015</a:t>
+              <a:t>5/11/2015</a:t>
             </a:fld>
             <a:endParaRPr lang="en-US"/>
           </a:p>
@@ -10810,7 +10810,7 @@
     <p:controls>
       <mc:AlternateContent xmlns:mc="http://schemas.openxmlformats.org/markup-compatibility/2006">
         <mc:Choice xmlns:v="urn:schemas-microsoft-com:vml" Requires="v">
-          <p:control spid="1036" name="ShockwaveFlash1" r:id="rId2" imgW="8229600" imgH="4572000"/>
+          <p:control spid="1037" name="ShockwaveFlash1" r:id="rId2" imgW="8229600" imgH="4572000"/>
         </mc:Choice>
         <mc:Fallback>
           <p:control name="ShockwaveFlash1" r:id="rId2" imgW="8229600" imgH="4572000">
@@ -11841,13 +11841,13 @@
   <p:clrMapOvr>
     <a:masterClrMapping/>
   </p:clrMapOvr>
-  <mc:AlternateContent xmlns:mc="http://schemas.openxmlformats.org/markup-compatibility/2006">
-    <mc:Choice xmlns:p14="http://schemas.microsoft.com/office/powerpoint/2010/main" Requires="p14">
+  <mc:AlternateContent xmlns:mc="http://schemas.openxmlformats.org/markup-compatibility/2006" xmlns:p14="http://schemas.microsoft.com/office/powerpoint/2010/main">
+    <mc:Choice Requires="p14">
       <p:transition spd="med" p14:dur="700">
         <p:fade/>
       </p:transition>
     </mc:Choice>
-    <mc:Fallback>
+    <mc:Fallback xmlns="">
       <p:transition spd="med">
         <p:fade/>
       </p:transition>
@@ -12309,7 +12309,6 @@
               <a:rPr lang="en-US" sz="1633" dirty="0"/>
               <a:t>Docker Client</a:t>
             </a:r>
-            <a:endParaRPr lang="en-US" sz="1633" dirty="0"/>
           </a:p>
         </p:txBody>
       </p:sp>
@@ -12500,13 +12499,13 @@
   <p:clrMapOvr>
     <a:masterClrMapping/>
   </p:clrMapOvr>
-  <mc:AlternateContent xmlns:mc="http://schemas.openxmlformats.org/markup-compatibility/2006">
-    <mc:Choice xmlns:p14="http://schemas.microsoft.com/office/powerpoint/2010/main" Requires="p14">
+  <mc:AlternateContent xmlns:mc="http://schemas.openxmlformats.org/markup-compatibility/2006" xmlns:p14="http://schemas.microsoft.com/office/powerpoint/2010/main">
+    <mc:Choice Requires="p14">
       <p:transition spd="med" p14:dur="700">
         <p:fade/>
       </p:transition>
     </mc:Choice>
-    <mc:Fallback>
+    <mc:Fallback xmlns="">
       <p:transition spd="med">
         <p:fade/>
       </p:transition>
@@ -12968,7 +12967,6 @@
               <a:rPr lang="en-US" sz="1633" dirty="0"/>
               <a:t>Docker Client</a:t>
             </a:r>
-            <a:endParaRPr lang="en-US" sz="1633" dirty="0"/>
           </a:p>
         </p:txBody>
       </p:sp>
@@ -13245,7 +13243,6 @@
               <a:rPr lang="en-US" sz="1633" dirty="0"/>
               <a:t>Your own cloud</a:t>
             </a:r>
-            <a:endParaRPr lang="en-US" sz="1633" dirty="0"/>
           </a:p>
         </p:txBody>
       </p:sp>
@@ -13259,13 +13256,13 @@
   <p:clrMapOvr>
     <a:masterClrMapping/>
   </p:clrMapOvr>
-  <mc:AlternateContent xmlns:mc="http://schemas.openxmlformats.org/markup-compatibility/2006">
-    <mc:Choice xmlns:p14="http://schemas.microsoft.com/office/powerpoint/2010/main" Requires="p14">
+  <mc:AlternateContent xmlns:mc="http://schemas.openxmlformats.org/markup-compatibility/2006" xmlns:p14="http://schemas.microsoft.com/office/powerpoint/2010/main">
+    <mc:Choice Requires="p14">
       <p:transition spd="med" p14:dur="700">
         <p:fade/>
       </p:transition>
     </mc:Choice>
-    <mc:Fallback>
+    <mc:Fallback xmlns="">
       <p:transition spd="med">
         <p:fade/>
       </p:transition>
@@ -13735,7 +13732,6 @@
               <a:rPr lang="en-US" sz="1633" dirty="0"/>
               <a:t>Docker Client</a:t>
             </a:r>
-            <a:endParaRPr lang="en-US" sz="1633" dirty="0"/>
           </a:p>
         </p:txBody>
       </p:sp>
@@ -14012,7 +14008,6 @@
               <a:rPr lang="en-US" sz="1633" dirty="0"/>
               <a:t>Your own cloud</a:t>
             </a:r>
-            <a:endParaRPr lang="en-US" sz="1633" dirty="0"/>
           </a:p>
         </p:txBody>
       </p:sp>
@@ -14224,13 +14219,13 @@
   <p:clrMapOvr>
     <a:masterClrMapping/>
   </p:clrMapOvr>
-  <mc:AlternateContent xmlns:mc="http://schemas.openxmlformats.org/markup-compatibility/2006">
-    <mc:Choice xmlns:p14="http://schemas.microsoft.com/office/powerpoint/2010/main" Requires="p14">
+  <mc:AlternateContent xmlns:mc="http://schemas.openxmlformats.org/markup-compatibility/2006" xmlns:p14="http://schemas.microsoft.com/office/powerpoint/2010/main">
+    <mc:Choice Requires="p14">
       <p:transition spd="med" p14:dur="700">
         <p:fade/>
       </p:transition>
     </mc:Choice>
-    <mc:Fallback>
+    <mc:Fallback xmlns="">
       <p:transition spd="med">
         <p:fade/>
       </p:transition>
@@ -14336,7 +14331,6 @@
               <a:rPr lang="en-US" sz="1633" dirty="0"/>
               <a:t>https://www.kickstarter.com/projects/1598272670/chip-the-worlds-first-9-computer</a:t>
             </a:r>
-            <a:endParaRPr lang="en-US" sz="1633" dirty="0"/>
           </a:p>
         </p:txBody>
       </p:sp>
@@ -14660,13 +14654,13 @@
   <p:clrMapOvr>
     <a:masterClrMapping/>
   </p:clrMapOvr>
-  <mc:AlternateContent xmlns:mc="http://schemas.openxmlformats.org/markup-compatibility/2006">
-    <mc:Choice xmlns:p14="http://schemas.microsoft.com/office/powerpoint/2010/main" Requires="p14">
+  <mc:AlternateContent xmlns:mc="http://schemas.openxmlformats.org/markup-compatibility/2006" xmlns:p14="http://schemas.microsoft.com/office/powerpoint/2010/main">
+    <mc:Choice Requires="p14">
       <p:transition spd="med" p14:dur="700">
         <p:fade/>
       </p:transition>
     </mc:Choice>
-    <mc:Fallback>
+    <mc:Fallback xmlns="">
       <p:transition spd="med">
         <p:fade/>
       </p:transition>
@@ -14876,7 +14870,6 @@
               <a:rPr lang="en-US" sz="2000" dirty="0"/>
               <a:t> Project Atomic, Microsoft’s resource group templates…. </a:t>
             </a:r>
-            <a:endParaRPr lang="en-US" sz="2000" dirty="0"/>
           </a:p>
         </p:txBody>
       </p:sp>
@@ -14890,13 +14883,13 @@
   <p:clrMapOvr>
     <a:masterClrMapping/>
   </p:clrMapOvr>
-  <mc:AlternateContent xmlns:mc="http://schemas.openxmlformats.org/markup-compatibility/2006">
-    <mc:Choice xmlns:p14="http://schemas.microsoft.com/office/powerpoint/2010/main" Requires="p14">
+  <mc:AlternateContent xmlns:mc="http://schemas.openxmlformats.org/markup-compatibility/2006" xmlns:p14="http://schemas.microsoft.com/office/powerpoint/2010/main">
+    <mc:Choice Requires="p14">
       <p:transition spd="med" p14:dur="700">
         <p:fade/>
       </p:transition>
     </mc:Choice>
-    <mc:Fallback>
+    <mc:Fallback xmlns="">
       <p:transition spd="med">
         <p:fade/>
       </p:transition>

</xml_diff>